<commit_message>
Errata de la presentación y memoria corregida
</commit_message>
<xml_diff>
--- a/src/memoria/presentacion.pptx
+++ b/src/memoria/presentacion.pptx
@@ -5,7 +5,7 @@
     <p:sldMasterId id="2147483701" r:id="rId1"/>
   </p:sldMasterIdLst>
   <p:notesMasterIdLst>
-    <p:notesMasterId r:id="rId20"/>
+    <p:notesMasterId r:id="rId22"/>
   </p:notesMasterIdLst>
   <p:sldIdLst>
     <p:sldId id="341" r:id="rId2"/>
@@ -25,24 +25,26 @@
     <p:sldId id="356" r:id="rId16"/>
     <p:sldId id="360" r:id="rId17"/>
     <p:sldId id="346" r:id="rId18"/>
-    <p:sldId id="259" r:id="rId19"/>
+    <p:sldId id="361" r:id="rId19"/>
+    <p:sldId id="362" r:id="rId20"/>
+    <p:sldId id="259" r:id="rId21"/>
   </p:sldIdLst>
   <p:sldSz cx="9144000" cy="5143500" type="screen16x9"/>
   <p:notesSz cx="6858000" cy="9144000"/>
   <p:embeddedFontLst>
     <p:embeddedFont>
       <p:font typeface="Consolas" panose="020B0609020204030204" pitchFamily="49" charset="0"/>
-      <p:regular r:id="rId21"/>
-      <p:bold r:id="rId22"/>
-      <p:italic r:id="rId23"/>
-      <p:boldItalic r:id="rId24"/>
+      <p:regular r:id="rId23"/>
+      <p:bold r:id="rId24"/>
+      <p:italic r:id="rId25"/>
+      <p:boldItalic r:id="rId26"/>
     </p:embeddedFont>
     <p:embeddedFont>
       <p:font typeface="Montserrat" panose="00000500000000000000" pitchFamily="2" charset="0"/>
-      <p:regular r:id="rId25"/>
-      <p:bold r:id="rId26"/>
-      <p:italic r:id="rId27"/>
-      <p:boldItalic r:id="rId28"/>
+      <p:regular r:id="rId27"/>
+      <p:bold r:id="rId28"/>
+      <p:italic r:id="rId29"/>
+      <p:boldItalic r:id="rId30"/>
     </p:embeddedFont>
   </p:embeddedFontLst>
   <p:defaultTextStyle>
@@ -1704,7 +1706,7 @@
   <p:cSld>
     <p:spTree>
       <p:nvGrpSpPr>
-        <p:cNvPr id="1" name="Shape 513"/>
+        <p:cNvPr id="1" name="Shape 705"/>
         <p:cNvGrpSpPr/>
         <p:nvPr/>
       </p:nvGrpSpPr>
@@ -1718,7 +1720,7 @@
       </p:grpSpPr>
       <p:sp>
         <p:nvSpPr>
-          <p:cNvPr id="514" name="Google Shape;514;g149e8d50373_0_0:notes"/>
+          <p:cNvPr id="706" name="Google Shape;706;g15631c336f0_0_4317:notes"/>
           <p:cNvSpPr>
             <a:spLocks noGrp="1" noRot="1" noChangeAspect="1"/>
           </p:cNvSpPr>
@@ -1759,7 +1761,7 @@
       </p:sp>
       <p:sp>
         <p:nvSpPr>
-          <p:cNvPr id="515" name="Google Shape;515;g149e8d50373_0_0:notes"/>
+          <p:cNvPr id="707" name="Google Shape;707;g15631c336f0_0_4317:notes"/>
           <p:cNvSpPr txBox="1">
             <a:spLocks noGrp="1"/>
           </p:cNvSpPr>
@@ -1796,6 +1798,120 @@
         </p:txBody>
       </p:sp>
     </p:spTree>
+    <p:extLst>
+      <p:ext uri="{BB962C8B-B14F-4D97-AF65-F5344CB8AC3E}">
+        <p14:creationId xmlns:p14="http://schemas.microsoft.com/office/powerpoint/2010/main" val="2453033043"/>
+      </p:ext>
+    </p:extLst>
+  </p:cSld>
+  <p:clrMapOvr>
+    <a:masterClrMapping/>
+  </p:clrMapOvr>
+</p:notes>
+</file>
+
+<file path=ppt/notesSlides/notesSlide19.xml><?xml version="1.0" encoding="utf-8"?>
+<p:notes xmlns:a="http://schemas.openxmlformats.org/drawingml/2006/main" xmlns:r="http://schemas.openxmlformats.org/officeDocument/2006/relationships" xmlns:p="http://schemas.openxmlformats.org/presentationml/2006/main" showMasterSp="0" showMasterPhAnim="0">
+  <p:cSld>
+    <p:spTree>
+      <p:nvGrpSpPr>
+        <p:cNvPr id="1" name="Shape 705"/>
+        <p:cNvGrpSpPr/>
+        <p:nvPr/>
+      </p:nvGrpSpPr>
+      <p:grpSpPr>
+        <a:xfrm>
+          <a:off x="0" y="0"/>
+          <a:ext cx="0" cy="0"/>
+          <a:chOff x="0" y="0"/>
+          <a:chExt cx="0" cy="0"/>
+        </a:xfrm>
+      </p:grpSpPr>
+      <p:sp>
+        <p:nvSpPr>
+          <p:cNvPr id="706" name="Google Shape;706;g15631c336f0_0_4317:notes"/>
+          <p:cNvSpPr>
+            <a:spLocks noGrp="1" noRot="1" noChangeAspect="1"/>
+          </p:cNvSpPr>
+          <p:nvPr>
+            <p:ph type="sldImg" idx="2"/>
+          </p:nvPr>
+        </p:nvSpPr>
+        <p:spPr>
+          <a:xfrm>
+            <a:off x="381000" y="685800"/>
+            <a:ext cx="6096000" cy="3429000"/>
+          </a:xfrm>
+          <a:custGeom>
+            <a:avLst/>
+            <a:gdLst/>
+            <a:ahLst/>
+            <a:cxnLst/>
+            <a:rect l="l" t="t" r="r" b="b"/>
+            <a:pathLst>
+              <a:path w="120000" h="120000" extrusionOk="0">
+                <a:moveTo>
+                  <a:pt x="0" y="0"/>
+                </a:moveTo>
+                <a:lnTo>
+                  <a:pt x="120000" y="0"/>
+                </a:lnTo>
+                <a:lnTo>
+                  <a:pt x="120000" y="120000"/>
+                </a:lnTo>
+                <a:lnTo>
+                  <a:pt x="0" y="120000"/>
+                </a:lnTo>
+                <a:close/>
+              </a:path>
+            </a:pathLst>
+          </a:custGeom>
+        </p:spPr>
+      </p:sp>
+      <p:sp>
+        <p:nvSpPr>
+          <p:cNvPr id="707" name="Google Shape;707;g15631c336f0_0_4317:notes"/>
+          <p:cNvSpPr txBox="1">
+            <a:spLocks noGrp="1"/>
+          </p:cNvSpPr>
+          <p:nvPr>
+            <p:ph type="body" idx="1"/>
+          </p:nvPr>
+        </p:nvSpPr>
+        <p:spPr>
+          <a:xfrm>
+            <a:off x="685800" y="4343400"/>
+            <a:ext cx="5486400" cy="4114800"/>
+          </a:xfrm>
+          <a:prstGeom prst="rect">
+            <a:avLst/>
+          </a:prstGeom>
+        </p:spPr>
+        <p:txBody>
+          <a:bodyPr spcFirstLastPara="1" wrap="square" lIns="91425" tIns="91425" rIns="91425" bIns="91425" anchor="t" anchorCtr="0">
+            <a:noAutofit/>
+          </a:bodyPr>
+          <a:lstStyle/>
+          <a:p>
+            <a:pPr marL="0" lvl="0" indent="0" algn="l" rtl="0">
+              <a:spcBef>
+                <a:spcPts val="0"/>
+              </a:spcBef>
+              <a:spcAft>
+                <a:spcPts val="0"/>
+              </a:spcAft>
+              <a:buNone/>
+            </a:pPr>
+            <a:endParaRPr/>
+          </a:p>
+        </p:txBody>
+      </p:sp>
+    </p:spTree>
+    <p:extLst>
+      <p:ext uri="{BB962C8B-B14F-4D97-AF65-F5344CB8AC3E}">
+        <p14:creationId xmlns:p14="http://schemas.microsoft.com/office/powerpoint/2010/main" val="4014728849"/>
+      </p:ext>
+    </p:extLst>
   </p:cSld>
   <p:clrMapOvr>
     <a:masterClrMapping/>
@@ -1864,6 +1980,110 @@
       <p:sp>
         <p:nvSpPr>
           <p:cNvPr id="574" name="Google Shape;574;g87664a2081_0_22:notes"/>
+          <p:cNvSpPr txBox="1">
+            <a:spLocks noGrp="1"/>
+          </p:cNvSpPr>
+          <p:nvPr>
+            <p:ph type="body" idx="1"/>
+          </p:nvPr>
+        </p:nvSpPr>
+        <p:spPr>
+          <a:xfrm>
+            <a:off x="685800" y="4343400"/>
+            <a:ext cx="5486400" cy="4114800"/>
+          </a:xfrm>
+          <a:prstGeom prst="rect">
+            <a:avLst/>
+          </a:prstGeom>
+        </p:spPr>
+        <p:txBody>
+          <a:bodyPr spcFirstLastPara="1" wrap="square" lIns="91425" tIns="91425" rIns="91425" bIns="91425" anchor="t" anchorCtr="0">
+            <a:noAutofit/>
+          </a:bodyPr>
+          <a:lstStyle/>
+          <a:p>
+            <a:pPr marL="0" lvl="0" indent="0" algn="l" rtl="0">
+              <a:spcBef>
+                <a:spcPts val="0"/>
+              </a:spcBef>
+              <a:spcAft>
+                <a:spcPts val="0"/>
+              </a:spcAft>
+              <a:buNone/>
+            </a:pPr>
+            <a:endParaRPr/>
+          </a:p>
+        </p:txBody>
+      </p:sp>
+    </p:spTree>
+  </p:cSld>
+  <p:clrMapOvr>
+    <a:masterClrMapping/>
+  </p:clrMapOvr>
+</p:notes>
+</file>
+
+<file path=ppt/notesSlides/notesSlide20.xml><?xml version="1.0" encoding="utf-8"?>
+<p:notes xmlns:a="http://schemas.openxmlformats.org/drawingml/2006/main" xmlns:r="http://schemas.openxmlformats.org/officeDocument/2006/relationships" xmlns:p="http://schemas.openxmlformats.org/presentationml/2006/main" showMasterSp="0" showMasterPhAnim="0">
+  <p:cSld>
+    <p:spTree>
+      <p:nvGrpSpPr>
+        <p:cNvPr id="1" name="Shape 513"/>
+        <p:cNvGrpSpPr/>
+        <p:nvPr/>
+      </p:nvGrpSpPr>
+      <p:grpSpPr>
+        <a:xfrm>
+          <a:off x="0" y="0"/>
+          <a:ext cx="0" cy="0"/>
+          <a:chOff x="0" y="0"/>
+          <a:chExt cx="0" cy="0"/>
+        </a:xfrm>
+      </p:grpSpPr>
+      <p:sp>
+        <p:nvSpPr>
+          <p:cNvPr id="514" name="Google Shape;514;g149e8d50373_0_0:notes"/>
+          <p:cNvSpPr>
+            <a:spLocks noGrp="1" noRot="1" noChangeAspect="1"/>
+          </p:cNvSpPr>
+          <p:nvPr>
+            <p:ph type="sldImg" idx="2"/>
+          </p:nvPr>
+        </p:nvSpPr>
+        <p:spPr>
+          <a:xfrm>
+            <a:off x="381000" y="685800"/>
+            <a:ext cx="6096000" cy="3429000"/>
+          </a:xfrm>
+          <a:custGeom>
+            <a:avLst/>
+            <a:gdLst/>
+            <a:ahLst/>
+            <a:cxnLst/>
+            <a:rect l="l" t="t" r="r" b="b"/>
+            <a:pathLst>
+              <a:path w="120000" h="120000" extrusionOk="0">
+                <a:moveTo>
+                  <a:pt x="0" y="0"/>
+                </a:moveTo>
+                <a:lnTo>
+                  <a:pt x="120000" y="0"/>
+                </a:lnTo>
+                <a:lnTo>
+                  <a:pt x="120000" y="120000"/>
+                </a:lnTo>
+                <a:lnTo>
+                  <a:pt x="0" y="120000"/>
+                </a:lnTo>
+                <a:close/>
+              </a:path>
+            </a:pathLst>
+          </a:custGeom>
+        </p:spPr>
+      </p:sp>
+      <p:sp>
+        <p:nvSpPr>
+          <p:cNvPr id="515" name="Google Shape;515;g149e8d50373_0_0:notes"/>
           <p:cNvSpPr txBox="1">
             <a:spLocks noGrp="1"/>
           </p:cNvSpPr>
@@ -11947,6 +12167,2469 @@
 </file>
 
 <file path=ppt/slides/slide18.xml><?xml version="1.0" encoding="utf-8"?>
+<p:sld xmlns:a="http://schemas.openxmlformats.org/drawingml/2006/main" xmlns:r="http://schemas.openxmlformats.org/officeDocument/2006/relationships" xmlns:p="http://schemas.openxmlformats.org/presentationml/2006/main">
+  <p:cSld>
+    <p:spTree>
+      <p:nvGrpSpPr>
+        <p:cNvPr id="1" name="Shape 708"/>
+        <p:cNvGrpSpPr/>
+        <p:nvPr/>
+      </p:nvGrpSpPr>
+      <p:grpSpPr>
+        <a:xfrm>
+          <a:off x="0" y="0"/>
+          <a:ext cx="0" cy="0"/>
+          <a:chOff x="0" y="0"/>
+          <a:chExt cx="0" cy="0"/>
+        </a:xfrm>
+      </p:grpSpPr>
+      <p:sp>
+        <p:nvSpPr>
+          <p:cNvPr id="718" name="Google Shape;718;p68"/>
+          <p:cNvSpPr txBox="1">
+            <a:spLocks noGrp="1"/>
+          </p:cNvSpPr>
+          <p:nvPr>
+            <p:ph type="title"/>
+          </p:nvPr>
+        </p:nvSpPr>
+        <p:spPr>
+          <a:xfrm>
+            <a:off x="1094125" y="433475"/>
+            <a:ext cx="7738200" cy="572700"/>
+          </a:xfrm>
+          <a:prstGeom prst="rect">
+            <a:avLst/>
+          </a:prstGeom>
+        </p:spPr>
+        <p:txBody>
+          <a:bodyPr spcFirstLastPara="1" wrap="square" lIns="91425" tIns="91425" rIns="91425" bIns="91425" anchor="t" anchorCtr="0">
+            <a:noAutofit/>
+          </a:bodyPr>
+          <a:lstStyle/>
+          <a:p>
+            <a:pPr marL="0" lvl="0" indent="0" algn="l" rtl="0">
+              <a:spcBef>
+                <a:spcPts val="0"/>
+              </a:spcBef>
+              <a:spcAft>
+                <a:spcPts val="0"/>
+              </a:spcAft>
+              <a:buClr>
+                <a:schemeClr val="dk1"/>
+              </a:buClr>
+              <a:buSzPts val="1100"/>
+              <a:buFont typeface="Arial"/>
+              <a:buNone/>
+            </a:pPr>
+            <a:r>
+              <a:rPr lang="en" dirty="0"/>
+              <a:t>Conclusiones</a:t>
+            </a:r>
+            <a:endParaRPr dirty="0"/>
+          </a:p>
+        </p:txBody>
+      </p:sp>
+      <p:sp>
+        <p:nvSpPr>
+          <p:cNvPr id="2" name="CuadroTexto 1">
+            <a:extLst>
+              <a:ext uri="{FF2B5EF4-FFF2-40B4-BE49-F238E27FC236}">
+                <a16:creationId xmlns:a16="http://schemas.microsoft.com/office/drawing/2014/main" id="{6209BF98-0319-41F2-1287-E3908EC86F50}"/>
+              </a:ext>
+            </a:extLst>
+          </p:cNvPr>
+          <p:cNvSpPr txBox="1"/>
+          <p:nvPr/>
+        </p:nvSpPr>
+        <p:spPr>
+          <a:xfrm>
+            <a:off x="427729" y="1439557"/>
+            <a:ext cx="8404596" cy="2793842"/>
+          </a:xfrm>
+          <a:prstGeom prst="rect">
+            <a:avLst/>
+          </a:prstGeom>
+          <a:solidFill>
+            <a:schemeClr val="bg1"/>
+          </a:solidFill>
+        </p:spPr>
+        <p:txBody>
+          <a:bodyPr wrap="square" rtlCol="0">
+            <a:spAutoFit/>
+          </a:bodyPr>
+          <a:lstStyle/>
+          <a:p>
+            <a:pPr marL="285750" indent="-285750">
+              <a:lnSpc>
+                <a:spcPct val="150000"/>
+              </a:lnSpc>
+              <a:buFont typeface="Wingdings" panose="05000000000000000000" pitchFamily="2" charset="2"/>
+              <a:buChar char="§"/>
+            </a:pPr>
+            <a:r>
+              <a:rPr lang="es-ES" sz="2400" dirty="0">
+                <a:solidFill>
+                  <a:schemeClr val="accent1"/>
+                </a:solidFill>
+              </a:rPr>
+              <a:t>La </a:t>
+            </a:r>
+            <a:r>
+              <a:rPr lang="es-ES" sz="2400" b="1" dirty="0">
+                <a:solidFill>
+                  <a:schemeClr val="accent2"/>
+                </a:solidFill>
+              </a:rPr>
+              <a:t>rama</a:t>
+            </a:r>
+            <a:r>
+              <a:rPr lang="es-ES" sz="2400" dirty="0">
+                <a:solidFill>
+                  <a:schemeClr val="accent1"/>
+                </a:solidFill>
+              </a:rPr>
+              <a:t> </a:t>
+            </a:r>
+            <a:r>
+              <a:rPr lang="es-ES" sz="2400" dirty="0">
+                <a:solidFill>
+                  <a:schemeClr val="accent3"/>
+                </a:solidFill>
+              </a:rPr>
+              <a:t>influye</a:t>
+            </a:r>
+            <a:r>
+              <a:rPr lang="es-ES" sz="2400" dirty="0">
+                <a:solidFill>
+                  <a:schemeClr val="accent1"/>
+                </a:solidFill>
+              </a:rPr>
+              <a:t> en la empleabilidad</a:t>
+            </a:r>
+          </a:p>
+          <a:p>
+            <a:pPr marL="285750" indent="-285750">
+              <a:lnSpc>
+                <a:spcPct val="150000"/>
+              </a:lnSpc>
+              <a:buFont typeface="Wingdings" panose="05000000000000000000" pitchFamily="2" charset="2"/>
+              <a:buChar char="§"/>
+            </a:pPr>
+            <a:r>
+              <a:rPr lang="es-ES" sz="2400" dirty="0">
+                <a:solidFill>
+                  <a:schemeClr val="accent1"/>
+                </a:solidFill>
+              </a:rPr>
+              <a:t>La </a:t>
+            </a:r>
+            <a:r>
+              <a:rPr lang="es-ES" sz="2400" b="1" dirty="0">
+                <a:solidFill>
+                  <a:schemeClr val="accent2"/>
+                </a:solidFill>
+              </a:rPr>
+              <a:t>edad</a:t>
+            </a:r>
+            <a:r>
+              <a:rPr lang="es-ES" sz="2400" dirty="0">
+                <a:solidFill>
+                  <a:schemeClr val="accent1"/>
+                </a:solidFill>
+              </a:rPr>
+              <a:t> </a:t>
+            </a:r>
+            <a:r>
+              <a:rPr lang="es-ES" sz="2400" dirty="0">
+                <a:solidFill>
+                  <a:schemeClr val="accent3"/>
+                </a:solidFill>
+              </a:rPr>
+              <a:t>no influye </a:t>
+            </a:r>
+            <a:r>
+              <a:rPr lang="es-ES" sz="2400" dirty="0">
+                <a:solidFill>
+                  <a:schemeClr val="accent1"/>
+                </a:solidFill>
+              </a:rPr>
+              <a:t>en la empleabilidad</a:t>
+            </a:r>
+          </a:p>
+          <a:p>
+            <a:pPr marL="285750" indent="-285750">
+              <a:lnSpc>
+                <a:spcPct val="150000"/>
+              </a:lnSpc>
+              <a:buFont typeface="Wingdings" panose="05000000000000000000" pitchFamily="2" charset="2"/>
+              <a:buChar char="§"/>
+            </a:pPr>
+            <a:r>
+              <a:rPr lang="es-ES" sz="2400" dirty="0">
+                <a:solidFill>
+                  <a:schemeClr val="accent1"/>
+                </a:solidFill>
+              </a:rPr>
+              <a:t>El </a:t>
+            </a:r>
+            <a:r>
+              <a:rPr lang="es-ES" sz="2400" b="1" dirty="0">
+                <a:solidFill>
+                  <a:schemeClr val="accent2"/>
+                </a:solidFill>
+              </a:rPr>
+              <a:t>tipo de universidad </a:t>
+            </a:r>
+            <a:r>
+              <a:rPr lang="es-ES" sz="2400" dirty="0">
+                <a:solidFill>
+                  <a:schemeClr val="accent3"/>
+                </a:solidFill>
+              </a:rPr>
+              <a:t>influye bastante </a:t>
+            </a:r>
+            <a:r>
+              <a:rPr lang="es-ES" sz="2400" dirty="0">
+                <a:solidFill>
+                  <a:schemeClr val="accent1"/>
+                </a:solidFill>
+              </a:rPr>
+              <a:t>en la empleabilidad</a:t>
+            </a:r>
+          </a:p>
+          <a:p>
+            <a:pPr marL="285750" indent="-285750">
+              <a:lnSpc>
+                <a:spcPct val="150000"/>
+              </a:lnSpc>
+              <a:buFont typeface="Wingdings" panose="05000000000000000000" pitchFamily="2" charset="2"/>
+              <a:buChar char="§"/>
+            </a:pPr>
+            <a:r>
+              <a:rPr lang="es-ES" sz="2400" dirty="0">
+                <a:solidFill>
+                  <a:schemeClr val="accent1"/>
+                </a:solidFill>
+              </a:rPr>
+              <a:t>La </a:t>
+            </a:r>
+            <a:r>
+              <a:rPr lang="es-ES" sz="2400" b="1" dirty="0">
+                <a:solidFill>
+                  <a:schemeClr val="accent2"/>
+                </a:solidFill>
+              </a:rPr>
+              <a:t>motivación</a:t>
+            </a:r>
+            <a:r>
+              <a:rPr lang="es-ES" sz="2400" dirty="0">
+                <a:solidFill>
+                  <a:schemeClr val="accent1"/>
+                </a:solidFill>
+              </a:rPr>
+              <a:t> por estudiar </a:t>
+            </a:r>
+            <a:r>
+              <a:rPr lang="es-ES" sz="2400" dirty="0">
+                <a:solidFill>
+                  <a:schemeClr val="accent3"/>
+                </a:solidFill>
+              </a:rPr>
+              <a:t>no</a:t>
+            </a:r>
+            <a:r>
+              <a:rPr lang="es-ES" sz="2400" b="1" dirty="0">
+                <a:solidFill>
+                  <a:schemeClr val="accent2"/>
+                </a:solidFill>
+              </a:rPr>
+              <a:t> </a:t>
+            </a:r>
+            <a:r>
+              <a:rPr lang="es-ES" sz="2400" dirty="0">
+                <a:solidFill>
+                  <a:schemeClr val="accent3"/>
+                </a:solidFill>
+              </a:rPr>
+              <a:t>influye </a:t>
+            </a:r>
+            <a:r>
+              <a:rPr lang="es-ES" sz="2400" dirty="0">
+                <a:solidFill>
+                  <a:schemeClr val="accent1"/>
+                </a:solidFill>
+              </a:rPr>
+              <a:t>en la empleabilidad</a:t>
+            </a:r>
+          </a:p>
+        </p:txBody>
+      </p:sp>
+    </p:spTree>
+    <p:extLst>
+      <p:ext uri="{BB962C8B-B14F-4D97-AF65-F5344CB8AC3E}">
+        <p14:creationId xmlns:p14="http://schemas.microsoft.com/office/powerpoint/2010/main" val="4169763949"/>
+      </p:ext>
+    </p:extLst>
+  </p:cSld>
+  <p:clrMapOvr>
+    <a:masterClrMapping/>
+  </p:clrMapOvr>
+</p:sld>
+</file>
+
+<file path=ppt/slides/slide19.xml><?xml version="1.0" encoding="utf-8"?>
+<p:sld xmlns:a="http://schemas.openxmlformats.org/drawingml/2006/main" xmlns:r="http://schemas.openxmlformats.org/officeDocument/2006/relationships" xmlns:p="http://schemas.openxmlformats.org/presentationml/2006/main">
+  <p:cSld>
+    <p:spTree>
+      <p:nvGrpSpPr>
+        <p:cNvPr id="1" name="Shape 708"/>
+        <p:cNvGrpSpPr/>
+        <p:nvPr/>
+      </p:nvGrpSpPr>
+      <p:grpSpPr>
+        <a:xfrm>
+          <a:off x="0" y="0"/>
+          <a:ext cx="0" cy="0"/>
+          <a:chOff x="0" y="0"/>
+          <a:chExt cx="0" cy="0"/>
+        </a:xfrm>
+      </p:grpSpPr>
+      <p:sp>
+        <p:nvSpPr>
+          <p:cNvPr id="718" name="Google Shape;718;p68"/>
+          <p:cNvSpPr txBox="1">
+            <a:spLocks noGrp="1"/>
+          </p:cNvSpPr>
+          <p:nvPr>
+            <p:ph type="title"/>
+          </p:nvPr>
+        </p:nvSpPr>
+        <p:spPr>
+          <a:xfrm>
+            <a:off x="1094125" y="433475"/>
+            <a:ext cx="7738200" cy="572700"/>
+          </a:xfrm>
+          <a:prstGeom prst="rect">
+            <a:avLst/>
+          </a:prstGeom>
+        </p:spPr>
+        <p:txBody>
+          <a:bodyPr spcFirstLastPara="1" wrap="square" lIns="91425" tIns="91425" rIns="91425" bIns="91425" anchor="t" anchorCtr="0">
+            <a:noAutofit/>
+          </a:bodyPr>
+          <a:lstStyle/>
+          <a:p>
+            <a:pPr marL="0" lvl="0" indent="0" algn="l" rtl="0">
+              <a:spcBef>
+                <a:spcPts val="0"/>
+              </a:spcBef>
+              <a:spcAft>
+                <a:spcPts val="0"/>
+              </a:spcAft>
+              <a:buClr>
+                <a:schemeClr val="dk1"/>
+              </a:buClr>
+              <a:buSzPts val="1100"/>
+              <a:buFont typeface="Arial"/>
+              <a:buNone/>
+            </a:pPr>
+            <a:r>
+              <a:rPr lang="en" dirty="0"/>
+              <a:t>Oportunidades futuras</a:t>
+            </a:r>
+            <a:endParaRPr dirty="0"/>
+          </a:p>
+        </p:txBody>
+      </p:sp>
+      <p:sp>
+        <p:nvSpPr>
+          <p:cNvPr id="2" name="CuadroTexto 1">
+            <a:extLst>
+              <a:ext uri="{FF2B5EF4-FFF2-40B4-BE49-F238E27FC236}">
+                <a16:creationId xmlns:a16="http://schemas.microsoft.com/office/drawing/2014/main" id="{6209BF98-0319-41F2-1287-E3908EC86F50}"/>
+              </a:ext>
+            </a:extLst>
+          </p:cNvPr>
+          <p:cNvSpPr txBox="1"/>
+          <p:nvPr/>
+        </p:nvSpPr>
+        <p:spPr>
+          <a:xfrm>
+            <a:off x="702900" y="1362185"/>
+            <a:ext cx="8129425" cy="3347840"/>
+          </a:xfrm>
+          <a:prstGeom prst="rect">
+            <a:avLst/>
+          </a:prstGeom>
+          <a:solidFill>
+            <a:schemeClr val="bg1"/>
+          </a:solidFill>
+        </p:spPr>
+        <p:txBody>
+          <a:bodyPr wrap="square" rtlCol="0">
+            <a:spAutoFit/>
+          </a:bodyPr>
+          <a:lstStyle/>
+          <a:p>
+            <a:pPr marL="285750" indent="-285750">
+              <a:lnSpc>
+                <a:spcPct val="150000"/>
+              </a:lnSpc>
+              <a:buFont typeface="Wingdings" panose="05000000000000000000" pitchFamily="2" charset="2"/>
+              <a:buChar char="§"/>
+            </a:pPr>
+            <a:r>
+              <a:rPr lang="es-ES" sz="2400" dirty="0">
+                <a:solidFill>
+                  <a:schemeClr val="accent1"/>
+                </a:solidFill>
+              </a:rPr>
+              <a:t>Diseño de programas educativos específicos</a:t>
+            </a:r>
+          </a:p>
+          <a:p>
+            <a:pPr marL="285750" indent="-285750">
+              <a:lnSpc>
+                <a:spcPct val="150000"/>
+              </a:lnSpc>
+              <a:buFont typeface="Wingdings" panose="05000000000000000000" pitchFamily="2" charset="2"/>
+              <a:buChar char="§"/>
+            </a:pPr>
+            <a:r>
+              <a:rPr lang="es-ES" sz="2400" dirty="0">
+                <a:solidFill>
+                  <a:schemeClr val="accent1"/>
+                </a:solidFill>
+              </a:rPr>
+              <a:t>Estrategias de inserción laboral</a:t>
+            </a:r>
+          </a:p>
+          <a:p>
+            <a:pPr marL="285750" indent="-285750">
+              <a:lnSpc>
+                <a:spcPct val="150000"/>
+              </a:lnSpc>
+              <a:buFont typeface="Wingdings" panose="05000000000000000000" pitchFamily="2" charset="2"/>
+              <a:buChar char="§"/>
+            </a:pPr>
+            <a:r>
+              <a:rPr lang="es-ES" sz="2400" dirty="0">
+                <a:solidFill>
+                  <a:schemeClr val="accent1"/>
+                </a:solidFill>
+              </a:rPr>
+              <a:t>Aumentar la colaboración entre las universidades y sectores específicos con mayores tasas de desempleo.</a:t>
+            </a:r>
+          </a:p>
+          <a:p>
+            <a:pPr marL="285750" indent="-285750">
+              <a:lnSpc>
+                <a:spcPct val="150000"/>
+              </a:lnSpc>
+              <a:buFont typeface="Wingdings" panose="05000000000000000000" pitchFamily="2" charset="2"/>
+              <a:buChar char="§"/>
+            </a:pPr>
+            <a:r>
+              <a:rPr lang="es-ES" sz="2400" dirty="0">
+                <a:solidFill>
+                  <a:schemeClr val="accent1"/>
+                </a:solidFill>
+              </a:rPr>
+              <a:t>Investigación adicional</a:t>
+            </a:r>
+          </a:p>
+          <a:p>
+            <a:pPr marL="285750" indent="-285750">
+              <a:lnSpc>
+                <a:spcPct val="150000"/>
+              </a:lnSpc>
+              <a:buFont typeface="Wingdings" panose="05000000000000000000" pitchFamily="2" charset="2"/>
+              <a:buChar char="§"/>
+            </a:pPr>
+            <a:endParaRPr lang="es-ES" sz="2400" dirty="0">
+              <a:solidFill>
+                <a:schemeClr val="accent1"/>
+              </a:solidFill>
+            </a:endParaRPr>
+          </a:p>
+        </p:txBody>
+      </p:sp>
+    </p:spTree>
+    <p:extLst>
+      <p:ext uri="{BB962C8B-B14F-4D97-AF65-F5344CB8AC3E}">
+        <p14:creationId xmlns:p14="http://schemas.microsoft.com/office/powerpoint/2010/main" val="4289060403"/>
+      </p:ext>
+    </p:extLst>
+  </p:cSld>
+  <p:clrMapOvr>
+    <a:masterClrMapping/>
+  </p:clrMapOvr>
+</p:sld>
+</file>
+
+<file path=ppt/slides/slide2.xml><?xml version="1.0" encoding="utf-8"?>
+<p:sld xmlns:a="http://schemas.openxmlformats.org/drawingml/2006/main" xmlns:r="http://schemas.openxmlformats.org/officeDocument/2006/relationships" xmlns:p="http://schemas.openxmlformats.org/presentationml/2006/main">
+  <p:cSld>
+    <p:spTree>
+      <p:nvGrpSpPr>
+        <p:cNvPr id="1" name="Shape 575"/>
+        <p:cNvGrpSpPr/>
+        <p:nvPr/>
+      </p:nvGrpSpPr>
+      <p:grpSpPr>
+        <a:xfrm>
+          <a:off x="0" y="0"/>
+          <a:ext cx="0" cy="0"/>
+          <a:chOff x="0" y="0"/>
+          <a:chExt cx="0" cy="0"/>
+        </a:xfrm>
+      </p:grpSpPr>
+      <p:sp>
+        <p:nvSpPr>
+          <p:cNvPr id="576" name="Google Shape;576;p61"/>
+          <p:cNvSpPr txBox="1">
+            <a:spLocks noGrp="1"/>
+          </p:cNvSpPr>
+          <p:nvPr>
+            <p:ph type="subTitle" idx="1"/>
+          </p:nvPr>
+        </p:nvSpPr>
+        <p:spPr>
+          <a:xfrm>
+            <a:off x="5909000" y="188144"/>
+            <a:ext cx="2448000" cy="359100"/>
+          </a:xfrm>
+          <a:prstGeom prst="rect">
+            <a:avLst/>
+          </a:prstGeom>
+        </p:spPr>
+        <p:txBody>
+          <a:bodyPr spcFirstLastPara="1" wrap="square" lIns="91425" tIns="91425" rIns="91425" bIns="91425" anchor="t" anchorCtr="0">
+            <a:noAutofit/>
+          </a:bodyPr>
+          <a:lstStyle/>
+          <a:p>
+            <a:pPr marL="0" lvl="0" indent="0" algn="l" rtl="0">
+              <a:spcBef>
+                <a:spcPts val="0"/>
+              </a:spcBef>
+              <a:spcAft>
+                <a:spcPts val="0"/>
+              </a:spcAft>
+              <a:buClr>
+                <a:schemeClr val="dk1"/>
+              </a:buClr>
+              <a:buSzPts val="1100"/>
+              <a:buFont typeface="Arial"/>
+              <a:buNone/>
+            </a:pPr>
+            <a:r>
+              <a:rPr lang="es-ES" dirty="0"/>
+              <a:t>Contexto</a:t>
+            </a:r>
+            <a:endParaRPr dirty="0"/>
+          </a:p>
+          <a:p>
+            <a:pPr marL="0" lvl="0" indent="0" algn="l" rtl="0">
+              <a:spcBef>
+                <a:spcPts val="0"/>
+              </a:spcBef>
+              <a:spcAft>
+                <a:spcPts val="0"/>
+              </a:spcAft>
+              <a:buNone/>
+            </a:pPr>
+            <a:endParaRPr dirty="0"/>
+          </a:p>
+        </p:txBody>
+      </p:sp>
+      <p:sp>
+        <p:nvSpPr>
+          <p:cNvPr id="577" name="Google Shape;577;p61"/>
+          <p:cNvSpPr txBox="1">
+            <a:spLocks noGrp="1"/>
+          </p:cNvSpPr>
+          <p:nvPr>
+            <p:ph type="subTitle" idx="2"/>
+          </p:nvPr>
+        </p:nvSpPr>
+        <p:spPr>
+          <a:xfrm>
+            <a:off x="5909000" y="582129"/>
+            <a:ext cx="2603098" cy="821100"/>
+          </a:xfrm>
+          <a:prstGeom prst="rect">
+            <a:avLst/>
+          </a:prstGeom>
+        </p:spPr>
+        <p:txBody>
+          <a:bodyPr spcFirstLastPara="1" wrap="square" lIns="91425" tIns="91425" rIns="91425" bIns="91425" anchor="t" anchorCtr="0">
+            <a:noAutofit/>
+          </a:bodyPr>
+          <a:lstStyle/>
+          <a:p>
+            <a:pPr marL="0" lvl="0" indent="0" algn="l" rtl="0">
+              <a:spcBef>
+                <a:spcPts val="0"/>
+              </a:spcBef>
+              <a:spcAft>
+                <a:spcPts val="0"/>
+              </a:spcAft>
+              <a:buClr>
+                <a:schemeClr val="dk1"/>
+              </a:buClr>
+              <a:buSzPts val="1100"/>
+              <a:buFont typeface="Arial"/>
+              <a:buNone/>
+            </a:pPr>
+            <a:r>
+              <a:rPr lang="en" dirty="0"/>
+              <a:t>Actualidad en el entorno laboral para universitarios</a:t>
+            </a:r>
+            <a:endParaRPr dirty="0"/>
+          </a:p>
+        </p:txBody>
+      </p:sp>
+      <p:sp>
+        <p:nvSpPr>
+          <p:cNvPr id="578" name="Google Shape;578;p61"/>
+          <p:cNvSpPr txBox="1">
+            <a:spLocks noGrp="1"/>
+          </p:cNvSpPr>
+          <p:nvPr>
+            <p:ph type="subTitle" idx="3"/>
+          </p:nvPr>
+        </p:nvSpPr>
+        <p:spPr>
+          <a:xfrm>
+            <a:off x="5909000" y="1334158"/>
+            <a:ext cx="2448000" cy="359100"/>
+          </a:xfrm>
+          <a:prstGeom prst="rect">
+            <a:avLst/>
+          </a:prstGeom>
+        </p:spPr>
+        <p:txBody>
+          <a:bodyPr spcFirstLastPara="1" wrap="square" lIns="91425" tIns="91425" rIns="91425" bIns="91425" anchor="t" anchorCtr="0">
+            <a:noAutofit/>
+          </a:bodyPr>
+          <a:lstStyle/>
+          <a:p>
+            <a:pPr marL="0" lvl="0" indent="0" algn="l" rtl="0">
+              <a:spcBef>
+                <a:spcPts val="0"/>
+              </a:spcBef>
+              <a:spcAft>
+                <a:spcPts val="0"/>
+              </a:spcAft>
+              <a:buClr>
+                <a:schemeClr val="dk1"/>
+              </a:buClr>
+              <a:buSzPts val="1100"/>
+              <a:buFont typeface="Arial"/>
+              <a:buNone/>
+            </a:pPr>
+            <a:r>
+              <a:rPr lang="en" dirty="0"/>
+              <a:t>Datos</a:t>
+            </a:r>
+            <a:endParaRPr dirty="0"/>
+          </a:p>
+        </p:txBody>
+      </p:sp>
+      <p:sp>
+        <p:nvSpPr>
+          <p:cNvPr id="579" name="Google Shape;579;p61"/>
+          <p:cNvSpPr txBox="1">
+            <a:spLocks noGrp="1"/>
+          </p:cNvSpPr>
+          <p:nvPr>
+            <p:ph type="subTitle" idx="4"/>
+          </p:nvPr>
+        </p:nvSpPr>
+        <p:spPr>
+          <a:xfrm>
+            <a:off x="5909000" y="1750650"/>
+            <a:ext cx="2448000" cy="821100"/>
+          </a:xfrm>
+          <a:prstGeom prst="rect">
+            <a:avLst/>
+          </a:prstGeom>
+        </p:spPr>
+        <p:txBody>
+          <a:bodyPr spcFirstLastPara="1" wrap="square" lIns="91425" tIns="91425" rIns="91425" bIns="91425" anchor="t" anchorCtr="0">
+            <a:noAutofit/>
+          </a:bodyPr>
+          <a:lstStyle/>
+          <a:p>
+            <a:pPr marL="0" lvl="0" indent="0" algn="l" rtl="0">
+              <a:spcBef>
+                <a:spcPts val="0"/>
+              </a:spcBef>
+              <a:spcAft>
+                <a:spcPts val="0"/>
+              </a:spcAft>
+              <a:buClr>
+                <a:schemeClr val="dk1"/>
+              </a:buClr>
+              <a:buSzPts val="1100"/>
+              <a:buFont typeface="Arial"/>
+              <a:buNone/>
+            </a:pPr>
+            <a:r>
+              <a:rPr lang="en" dirty="0"/>
+              <a:t>Contenido y fuente de los datos</a:t>
+            </a:r>
+            <a:endParaRPr dirty="0"/>
+          </a:p>
+        </p:txBody>
+      </p:sp>
+      <p:sp>
+        <p:nvSpPr>
+          <p:cNvPr id="580" name="Google Shape;580;p61"/>
+          <p:cNvSpPr txBox="1">
+            <a:spLocks noGrp="1"/>
+          </p:cNvSpPr>
+          <p:nvPr>
+            <p:ph type="subTitle" idx="5"/>
+          </p:nvPr>
+        </p:nvSpPr>
+        <p:spPr>
+          <a:xfrm>
+            <a:off x="5909000" y="3753161"/>
+            <a:ext cx="2448000" cy="359100"/>
+          </a:xfrm>
+          <a:prstGeom prst="rect">
+            <a:avLst/>
+          </a:prstGeom>
+        </p:spPr>
+        <p:txBody>
+          <a:bodyPr spcFirstLastPara="1" wrap="square" lIns="91425" tIns="91425" rIns="91425" bIns="91425" anchor="t" anchorCtr="0">
+            <a:noAutofit/>
+          </a:bodyPr>
+          <a:lstStyle/>
+          <a:p>
+            <a:pPr marL="0" lvl="0" indent="0" algn="l" rtl="0">
+              <a:spcBef>
+                <a:spcPts val="0"/>
+              </a:spcBef>
+              <a:spcAft>
+                <a:spcPts val="0"/>
+              </a:spcAft>
+              <a:buClr>
+                <a:schemeClr val="dk1"/>
+              </a:buClr>
+              <a:buSzPts val="1100"/>
+              <a:buFont typeface="Arial"/>
+              <a:buNone/>
+            </a:pPr>
+            <a:r>
+              <a:rPr lang="en" dirty="0"/>
+              <a:t>Conclusiones</a:t>
+            </a:r>
+            <a:endParaRPr dirty="0"/>
+          </a:p>
+        </p:txBody>
+      </p:sp>
+      <p:sp>
+        <p:nvSpPr>
+          <p:cNvPr id="581" name="Google Shape;581;p61"/>
+          <p:cNvSpPr txBox="1">
+            <a:spLocks noGrp="1"/>
+          </p:cNvSpPr>
+          <p:nvPr>
+            <p:ph type="subTitle" idx="6"/>
+          </p:nvPr>
+        </p:nvSpPr>
+        <p:spPr>
+          <a:xfrm>
+            <a:off x="5909000" y="4112261"/>
+            <a:ext cx="2448000" cy="821100"/>
+          </a:xfrm>
+          <a:prstGeom prst="rect">
+            <a:avLst/>
+          </a:prstGeom>
+        </p:spPr>
+        <p:txBody>
+          <a:bodyPr spcFirstLastPara="1" wrap="square" lIns="91425" tIns="91425" rIns="91425" bIns="91425" anchor="t" anchorCtr="0">
+            <a:noAutofit/>
+          </a:bodyPr>
+          <a:lstStyle/>
+          <a:p>
+            <a:pPr marL="0" lvl="0" indent="0" algn="l" rtl="0">
+              <a:spcBef>
+                <a:spcPts val="0"/>
+              </a:spcBef>
+              <a:spcAft>
+                <a:spcPts val="0"/>
+              </a:spcAft>
+              <a:buClr>
+                <a:schemeClr val="dk1"/>
+              </a:buClr>
+              <a:buSzPts val="1100"/>
+              <a:buFont typeface="Arial"/>
+              <a:buNone/>
+            </a:pPr>
+            <a:r>
+              <a:rPr lang="en" dirty="0"/>
+              <a:t>Resultados obtenidos y futuras oportunidades</a:t>
+            </a:r>
+            <a:endParaRPr dirty="0"/>
+          </a:p>
+        </p:txBody>
+      </p:sp>
+      <p:sp>
+        <p:nvSpPr>
+          <p:cNvPr id="582" name="Google Shape;582;p61"/>
+          <p:cNvSpPr txBox="1">
+            <a:spLocks noGrp="1"/>
+          </p:cNvSpPr>
+          <p:nvPr>
+            <p:ph type="title"/>
+          </p:nvPr>
+        </p:nvSpPr>
+        <p:spPr>
+          <a:xfrm>
+            <a:off x="831900" y="717175"/>
+            <a:ext cx="3144900" cy="3945900"/>
+          </a:xfrm>
+          <a:prstGeom prst="rect">
+            <a:avLst/>
+          </a:prstGeom>
+        </p:spPr>
+        <p:txBody>
+          <a:bodyPr spcFirstLastPara="1" wrap="square" lIns="91425" tIns="91425" rIns="91425" bIns="91425" anchor="ctr" anchorCtr="0">
+            <a:noAutofit/>
+          </a:bodyPr>
+          <a:lstStyle/>
+          <a:p>
+            <a:pPr marL="0" lvl="0" indent="0" algn="ctr" rtl="0">
+              <a:spcBef>
+                <a:spcPts val="0"/>
+              </a:spcBef>
+              <a:spcAft>
+                <a:spcPts val="0"/>
+              </a:spcAft>
+              <a:buNone/>
+            </a:pPr>
+            <a:r>
+              <a:rPr lang="en" dirty="0"/>
+              <a:t>ÍNDICE</a:t>
+            </a:r>
+            <a:endParaRPr dirty="0"/>
+          </a:p>
+        </p:txBody>
+      </p:sp>
+      <p:sp>
+        <p:nvSpPr>
+          <p:cNvPr id="583" name="Google Shape;583;p61"/>
+          <p:cNvSpPr txBox="1">
+            <a:spLocks noGrp="1"/>
+          </p:cNvSpPr>
+          <p:nvPr>
+            <p:ph type="title" idx="4294967295"/>
+          </p:nvPr>
+        </p:nvSpPr>
+        <p:spPr>
+          <a:xfrm>
+            <a:off x="4887550" y="312270"/>
+            <a:ext cx="821100" cy="821100"/>
+          </a:xfrm>
+          <a:prstGeom prst="rect">
+            <a:avLst/>
+          </a:prstGeom>
+        </p:spPr>
+        <p:txBody>
+          <a:bodyPr spcFirstLastPara="1" wrap="square" lIns="91425" tIns="91425" rIns="91425" bIns="91425" anchor="t" anchorCtr="0">
+            <a:noAutofit/>
+          </a:bodyPr>
+          <a:lstStyle/>
+          <a:p>
+            <a:pPr marL="0" lvl="0" indent="0" algn="l" rtl="0">
+              <a:spcBef>
+                <a:spcPts val="0"/>
+              </a:spcBef>
+              <a:spcAft>
+                <a:spcPts val="0"/>
+              </a:spcAft>
+              <a:buNone/>
+            </a:pPr>
+            <a:r>
+              <a:rPr lang="en"/>
+              <a:t>1.</a:t>
+            </a:r>
+            <a:endParaRPr dirty="0"/>
+          </a:p>
+        </p:txBody>
+      </p:sp>
+      <p:sp>
+        <p:nvSpPr>
+          <p:cNvPr id="584" name="Google Shape;584;p61"/>
+          <p:cNvSpPr txBox="1">
+            <a:spLocks noGrp="1"/>
+          </p:cNvSpPr>
+          <p:nvPr>
+            <p:ph type="title" idx="4294967295"/>
+          </p:nvPr>
+        </p:nvSpPr>
+        <p:spPr>
+          <a:xfrm>
+            <a:off x="4887550" y="1434772"/>
+            <a:ext cx="821100" cy="821100"/>
+          </a:xfrm>
+          <a:prstGeom prst="rect">
+            <a:avLst/>
+          </a:prstGeom>
+        </p:spPr>
+        <p:txBody>
+          <a:bodyPr spcFirstLastPara="1" wrap="square" lIns="91425" tIns="91425" rIns="91425" bIns="91425" anchor="t" anchorCtr="0">
+            <a:noAutofit/>
+          </a:bodyPr>
+          <a:lstStyle/>
+          <a:p>
+            <a:pPr marL="0" lvl="0" indent="0" algn="l" rtl="0">
+              <a:spcBef>
+                <a:spcPts val="0"/>
+              </a:spcBef>
+              <a:spcAft>
+                <a:spcPts val="0"/>
+              </a:spcAft>
+              <a:buNone/>
+            </a:pPr>
+            <a:r>
+              <a:rPr lang="en"/>
+              <a:t>2.</a:t>
+            </a:r>
+            <a:endParaRPr dirty="0"/>
+          </a:p>
+        </p:txBody>
+      </p:sp>
+      <p:sp>
+        <p:nvSpPr>
+          <p:cNvPr id="585" name="Google Shape;585;p61"/>
+          <p:cNvSpPr txBox="1">
+            <a:spLocks noGrp="1"/>
+          </p:cNvSpPr>
+          <p:nvPr>
+            <p:ph type="title" idx="4294967295"/>
+          </p:nvPr>
+        </p:nvSpPr>
+        <p:spPr>
+          <a:xfrm>
+            <a:off x="4887550" y="3791733"/>
+            <a:ext cx="821100" cy="821100"/>
+          </a:xfrm>
+          <a:prstGeom prst="rect">
+            <a:avLst/>
+          </a:prstGeom>
+        </p:spPr>
+        <p:txBody>
+          <a:bodyPr spcFirstLastPara="1" wrap="square" lIns="91425" tIns="91425" rIns="91425" bIns="91425" anchor="t" anchorCtr="0">
+            <a:noAutofit/>
+          </a:bodyPr>
+          <a:lstStyle/>
+          <a:p>
+            <a:pPr marL="0" lvl="0" indent="0" algn="l" rtl="0">
+              <a:spcBef>
+                <a:spcPts val="0"/>
+              </a:spcBef>
+              <a:spcAft>
+                <a:spcPts val="0"/>
+              </a:spcAft>
+              <a:buNone/>
+            </a:pPr>
+            <a:r>
+              <a:rPr lang="en"/>
+              <a:t>3.</a:t>
+            </a:r>
+            <a:endParaRPr dirty="0"/>
+          </a:p>
+        </p:txBody>
+      </p:sp>
+      <p:sp>
+        <p:nvSpPr>
+          <p:cNvPr id="586" name="Google Shape;586;p61"/>
+          <p:cNvSpPr/>
+          <p:nvPr/>
+        </p:nvSpPr>
+        <p:spPr>
+          <a:xfrm>
+            <a:off x="4887550" y="1434761"/>
+            <a:ext cx="821100" cy="821100"/>
+          </a:xfrm>
+          <a:prstGeom prst="round1Rect">
+            <a:avLst>
+              <a:gd name="adj" fmla="val 16667"/>
+            </a:avLst>
+          </a:prstGeom>
+          <a:solidFill>
+            <a:schemeClr val="accent2"/>
+          </a:solidFill>
+          <a:ln>
+            <a:noFill/>
+          </a:ln>
+        </p:spPr>
+        <p:txBody>
+          <a:bodyPr spcFirstLastPara="1" wrap="square" lIns="91425" tIns="91425" rIns="91425" bIns="91425" anchor="ctr" anchorCtr="0">
+            <a:noAutofit/>
+          </a:bodyPr>
+          <a:lstStyle/>
+          <a:p>
+            <a:pPr marL="0" lvl="0" indent="0" algn="l" rtl="0">
+              <a:lnSpc>
+                <a:spcPct val="100000"/>
+              </a:lnSpc>
+              <a:spcBef>
+                <a:spcPts val="0"/>
+              </a:spcBef>
+              <a:spcAft>
+                <a:spcPts val="0"/>
+              </a:spcAft>
+              <a:buNone/>
+            </a:pPr>
+            <a:endParaRPr dirty="0"/>
+          </a:p>
+        </p:txBody>
+      </p:sp>
+      <p:sp>
+        <p:nvSpPr>
+          <p:cNvPr id="587" name="Google Shape;587;p61"/>
+          <p:cNvSpPr/>
+          <p:nvPr/>
+        </p:nvSpPr>
+        <p:spPr>
+          <a:xfrm>
+            <a:off x="4887550" y="305343"/>
+            <a:ext cx="821100" cy="821100"/>
+          </a:xfrm>
+          <a:prstGeom prst="round1Rect">
+            <a:avLst>
+              <a:gd name="adj" fmla="val 16667"/>
+            </a:avLst>
+          </a:prstGeom>
+          <a:solidFill>
+            <a:schemeClr val="accent3"/>
+          </a:solidFill>
+          <a:ln>
+            <a:noFill/>
+          </a:ln>
+        </p:spPr>
+        <p:txBody>
+          <a:bodyPr spcFirstLastPara="1" wrap="square" lIns="91425" tIns="91425" rIns="91425" bIns="91425" anchor="ctr" anchorCtr="0">
+            <a:noAutofit/>
+          </a:bodyPr>
+          <a:lstStyle/>
+          <a:p>
+            <a:pPr marL="0" lvl="0" indent="0" algn="l" rtl="0">
+              <a:lnSpc>
+                <a:spcPct val="100000"/>
+              </a:lnSpc>
+              <a:spcBef>
+                <a:spcPts val="0"/>
+              </a:spcBef>
+              <a:spcAft>
+                <a:spcPts val="0"/>
+              </a:spcAft>
+              <a:buNone/>
+            </a:pPr>
+            <a:endParaRPr dirty="0"/>
+          </a:p>
+        </p:txBody>
+      </p:sp>
+      <p:sp>
+        <p:nvSpPr>
+          <p:cNvPr id="588" name="Google Shape;588;p61"/>
+          <p:cNvSpPr/>
+          <p:nvPr/>
+        </p:nvSpPr>
+        <p:spPr>
+          <a:xfrm>
+            <a:off x="4887550" y="3791721"/>
+            <a:ext cx="821100" cy="821100"/>
+          </a:xfrm>
+          <a:prstGeom prst="round1Rect">
+            <a:avLst>
+              <a:gd name="adj" fmla="val 16667"/>
+            </a:avLst>
+          </a:prstGeom>
+          <a:solidFill>
+            <a:schemeClr val="accent1"/>
+          </a:solidFill>
+          <a:ln>
+            <a:noFill/>
+          </a:ln>
+        </p:spPr>
+        <p:txBody>
+          <a:bodyPr spcFirstLastPara="1" wrap="square" lIns="91425" tIns="91425" rIns="91425" bIns="91425" anchor="ctr" anchorCtr="0">
+            <a:noAutofit/>
+          </a:bodyPr>
+          <a:lstStyle/>
+          <a:p>
+            <a:pPr marL="0" lvl="0" indent="0" algn="l" rtl="0">
+              <a:lnSpc>
+                <a:spcPct val="100000"/>
+              </a:lnSpc>
+              <a:spcBef>
+                <a:spcPts val="0"/>
+              </a:spcBef>
+              <a:spcAft>
+                <a:spcPts val="0"/>
+              </a:spcAft>
+              <a:buNone/>
+            </a:pPr>
+            <a:endParaRPr dirty="0"/>
+          </a:p>
+        </p:txBody>
+      </p:sp>
+      <p:sp>
+        <p:nvSpPr>
+          <p:cNvPr id="589" name="Google Shape;589;p61"/>
+          <p:cNvSpPr txBox="1">
+            <a:spLocks noGrp="1"/>
+          </p:cNvSpPr>
+          <p:nvPr>
+            <p:ph type="title" idx="4294967295"/>
+          </p:nvPr>
+        </p:nvSpPr>
+        <p:spPr>
+          <a:xfrm>
+            <a:off x="4887550" y="422620"/>
+            <a:ext cx="821100" cy="600300"/>
+          </a:xfrm>
+          <a:prstGeom prst="rect">
+            <a:avLst/>
+          </a:prstGeom>
+        </p:spPr>
+        <p:txBody>
+          <a:bodyPr spcFirstLastPara="1" wrap="square" lIns="91425" tIns="91425" rIns="91425" bIns="91425" anchor="ctr" anchorCtr="0">
+            <a:noAutofit/>
+          </a:bodyPr>
+          <a:lstStyle/>
+          <a:p>
+            <a:pPr marL="0" lvl="0" indent="0" algn="ctr" rtl="0">
+              <a:spcBef>
+                <a:spcPts val="0"/>
+              </a:spcBef>
+              <a:spcAft>
+                <a:spcPts val="0"/>
+              </a:spcAft>
+              <a:buNone/>
+            </a:pPr>
+            <a:r>
+              <a:rPr lang="en"/>
+              <a:t>1.</a:t>
+            </a:r>
+            <a:endParaRPr dirty="0"/>
+          </a:p>
+        </p:txBody>
+      </p:sp>
+      <p:sp>
+        <p:nvSpPr>
+          <p:cNvPr id="590" name="Google Shape;590;p61"/>
+          <p:cNvSpPr txBox="1">
+            <a:spLocks noGrp="1"/>
+          </p:cNvSpPr>
+          <p:nvPr>
+            <p:ph type="title" idx="4294967295"/>
+          </p:nvPr>
+        </p:nvSpPr>
+        <p:spPr>
+          <a:xfrm>
+            <a:off x="4887550" y="1545172"/>
+            <a:ext cx="821100" cy="600300"/>
+          </a:xfrm>
+          <a:prstGeom prst="rect">
+            <a:avLst/>
+          </a:prstGeom>
+        </p:spPr>
+        <p:txBody>
+          <a:bodyPr spcFirstLastPara="1" wrap="square" lIns="91425" tIns="91425" rIns="91425" bIns="91425" anchor="ctr" anchorCtr="0">
+            <a:noAutofit/>
+          </a:bodyPr>
+          <a:lstStyle/>
+          <a:p>
+            <a:pPr marL="0" lvl="0" indent="0" algn="ctr" rtl="0">
+              <a:spcBef>
+                <a:spcPts val="0"/>
+              </a:spcBef>
+              <a:spcAft>
+                <a:spcPts val="0"/>
+              </a:spcAft>
+              <a:buNone/>
+            </a:pPr>
+            <a:r>
+              <a:rPr lang="en" dirty="0"/>
+              <a:t>2</a:t>
+            </a:r>
+            <a:endParaRPr dirty="0"/>
+          </a:p>
+        </p:txBody>
+      </p:sp>
+      <p:sp>
+        <p:nvSpPr>
+          <p:cNvPr id="591" name="Google Shape;591;p61"/>
+          <p:cNvSpPr txBox="1">
+            <a:spLocks noGrp="1"/>
+          </p:cNvSpPr>
+          <p:nvPr>
+            <p:ph type="title" idx="4294967295"/>
+          </p:nvPr>
+        </p:nvSpPr>
+        <p:spPr>
+          <a:xfrm>
+            <a:off x="4887550" y="3902191"/>
+            <a:ext cx="821100" cy="600300"/>
+          </a:xfrm>
+          <a:prstGeom prst="rect">
+            <a:avLst/>
+          </a:prstGeom>
+        </p:spPr>
+        <p:txBody>
+          <a:bodyPr spcFirstLastPara="1" wrap="square" lIns="91425" tIns="91425" rIns="91425" bIns="91425" anchor="ctr" anchorCtr="0">
+            <a:noAutofit/>
+          </a:bodyPr>
+          <a:lstStyle/>
+          <a:p>
+            <a:pPr marL="0" lvl="0" indent="0" algn="ctr" rtl="0">
+              <a:spcBef>
+                <a:spcPts val="0"/>
+              </a:spcBef>
+              <a:spcAft>
+                <a:spcPts val="0"/>
+              </a:spcAft>
+              <a:buNone/>
+            </a:pPr>
+            <a:r>
+              <a:rPr lang="en" dirty="0"/>
+              <a:t>4</a:t>
+            </a:r>
+            <a:endParaRPr dirty="0"/>
+          </a:p>
+        </p:txBody>
+      </p:sp>
+      <p:sp>
+        <p:nvSpPr>
+          <p:cNvPr id="2" name="Google Shape;578;p61">
+            <a:extLst>
+              <a:ext uri="{FF2B5EF4-FFF2-40B4-BE49-F238E27FC236}">
+                <a16:creationId xmlns:a16="http://schemas.microsoft.com/office/drawing/2014/main" id="{167ACCE0-9D7D-612A-92FB-4273806C6BE1}"/>
+              </a:ext>
+            </a:extLst>
+          </p:cNvPr>
+          <p:cNvSpPr txBox="1">
+            <a:spLocks/>
+          </p:cNvSpPr>
+          <p:nvPr/>
+        </p:nvSpPr>
+        <p:spPr>
+          <a:xfrm>
+            <a:off x="5909000" y="2554129"/>
+            <a:ext cx="2448000" cy="359100"/>
+          </a:xfrm>
+          <a:prstGeom prst="rect">
+            <a:avLst/>
+          </a:prstGeom>
+          <a:noFill/>
+          <a:ln>
+            <a:noFill/>
+          </a:ln>
+        </p:spPr>
+        <p:txBody>
+          <a:bodyPr spcFirstLastPara="1" wrap="square" lIns="91425" tIns="91425" rIns="91425" bIns="91425" anchor="t" anchorCtr="0">
+            <a:noAutofit/>
+          </a:bodyPr>
+          <a:lstStyle>
+            <a:defPPr marR="0" lvl="0" algn="l" rtl="0">
+              <a:lnSpc>
+                <a:spcPct val="100000"/>
+              </a:lnSpc>
+              <a:spcBef>
+                <a:spcPts val="0"/>
+              </a:spcBef>
+              <a:spcAft>
+                <a:spcPts val="0"/>
+              </a:spcAft>
+            </a:defPPr>
+            <a:lvl1pPr marL="457200" marR="0" lvl="0" indent="-317500" algn="l" rtl="0">
+              <a:lnSpc>
+                <a:spcPct val="100000"/>
+              </a:lnSpc>
+              <a:spcBef>
+                <a:spcPts val="0"/>
+              </a:spcBef>
+              <a:spcAft>
+                <a:spcPts val="0"/>
+              </a:spcAft>
+              <a:buClr>
+                <a:schemeClr val="accent1"/>
+              </a:buClr>
+              <a:buSzPts val="1400"/>
+              <a:buFont typeface="Montserrat"/>
+              <a:buNone/>
+              <a:defRPr sz="1600" b="1" i="0" u="none" strike="noStrike" cap="none">
+                <a:solidFill>
+                  <a:schemeClr val="accent3"/>
+                </a:solidFill>
+                <a:latin typeface="Montserrat"/>
+                <a:ea typeface="Montserrat"/>
+                <a:cs typeface="Montserrat"/>
+                <a:sym typeface="Montserrat"/>
+              </a:defRPr>
+            </a:lvl1pPr>
+            <a:lvl2pPr marL="914400" marR="0" lvl="1" indent="-317500" algn="l" rtl="0">
+              <a:lnSpc>
+                <a:spcPct val="100000"/>
+              </a:lnSpc>
+              <a:spcBef>
+                <a:spcPts val="0"/>
+              </a:spcBef>
+              <a:spcAft>
+                <a:spcPts val="0"/>
+              </a:spcAft>
+              <a:buClr>
+                <a:schemeClr val="accent1"/>
+              </a:buClr>
+              <a:buSzPts val="1400"/>
+              <a:buFont typeface="Montserrat"/>
+              <a:buNone/>
+              <a:defRPr sz="1400" b="0" i="0" u="none" strike="noStrike" cap="none">
+                <a:solidFill>
+                  <a:schemeClr val="accent1"/>
+                </a:solidFill>
+                <a:latin typeface="Montserrat"/>
+                <a:ea typeface="Montserrat"/>
+                <a:cs typeface="Montserrat"/>
+                <a:sym typeface="Montserrat"/>
+              </a:defRPr>
+            </a:lvl2pPr>
+            <a:lvl3pPr marL="1371600" marR="0" lvl="2" indent="-317500" algn="l" rtl="0">
+              <a:lnSpc>
+                <a:spcPct val="100000"/>
+              </a:lnSpc>
+              <a:spcBef>
+                <a:spcPts val="0"/>
+              </a:spcBef>
+              <a:spcAft>
+                <a:spcPts val="0"/>
+              </a:spcAft>
+              <a:buClr>
+                <a:schemeClr val="accent1"/>
+              </a:buClr>
+              <a:buSzPts val="1400"/>
+              <a:buFont typeface="Montserrat"/>
+              <a:buNone/>
+              <a:defRPr sz="1400" b="0" i="0" u="none" strike="noStrike" cap="none">
+                <a:solidFill>
+                  <a:schemeClr val="accent1"/>
+                </a:solidFill>
+                <a:latin typeface="Montserrat"/>
+                <a:ea typeface="Montserrat"/>
+                <a:cs typeface="Montserrat"/>
+                <a:sym typeface="Montserrat"/>
+              </a:defRPr>
+            </a:lvl3pPr>
+            <a:lvl4pPr marL="1828800" marR="0" lvl="3" indent="-317500" algn="l" rtl="0">
+              <a:lnSpc>
+                <a:spcPct val="100000"/>
+              </a:lnSpc>
+              <a:spcBef>
+                <a:spcPts val="0"/>
+              </a:spcBef>
+              <a:spcAft>
+                <a:spcPts val="0"/>
+              </a:spcAft>
+              <a:buClr>
+                <a:schemeClr val="accent1"/>
+              </a:buClr>
+              <a:buSzPts val="1400"/>
+              <a:buFont typeface="Montserrat"/>
+              <a:buNone/>
+              <a:defRPr sz="1400" b="0" i="0" u="none" strike="noStrike" cap="none">
+                <a:solidFill>
+                  <a:schemeClr val="accent1"/>
+                </a:solidFill>
+                <a:latin typeface="Montserrat"/>
+                <a:ea typeface="Montserrat"/>
+                <a:cs typeface="Montserrat"/>
+                <a:sym typeface="Montserrat"/>
+              </a:defRPr>
+            </a:lvl4pPr>
+            <a:lvl5pPr marL="2286000" marR="0" lvl="4" indent="-317500" algn="l" rtl="0">
+              <a:lnSpc>
+                <a:spcPct val="100000"/>
+              </a:lnSpc>
+              <a:spcBef>
+                <a:spcPts val="0"/>
+              </a:spcBef>
+              <a:spcAft>
+                <a:spcPts val="0"/>
+              </a:spcAft>
+              <a:buClr>
+                <a:schemeClr val="accent1"/>
+              </a:buClr>
+              <a:buSzPts val="1400"/>
+              <a:buFont typeface="Montserrat"/>
+              <a:buNone/>
+              <a:defRPr sz="1400" b="0" i="0" u="none" strike="noStrike" cap="none">
+                <a:solidFill>
+                  <a:schemeClr val="accent1"/>
+                </a:solidFill>
+                <a:latin typeface="Montserrat"/>
+                <a:ea typeface="Montserrat"/>
+                <a:cs typeface="Montserrat"/>
+                <a:sym typeface="Montserrat"/>
+              </a:defRPr>
+            </a:lvl5pPr>
+            <a:lvl6pPr marL="2743200" marR="0" lvl="5" indent="-317500" algn="l" rtl="0">
+              <a:lnSpc>
+                <a:spcPct val="100000"/>
+              </a:lnSpc>
+              <a:spcBef>
+                <a:spcPts val="0"/>
+              </a:spcBef>
+              <a:spcAft>
+                <a:spcPts val="0"/>
+              </a:spcAft>
+              <a:buClr>
+                <a:schemeClr val="accent1"/>
+              </a:buClr>
+              <a:buSzPts val="1400"/>
+              <a:buFont typeface="Montserrat"/>
+              <a:buNone/>
+              <a:defRPr sz="1400" b="0" i="0" u="none" strike="noStrike" cap="none">
+                <a:solidFill>
+                  <a:schemeClr val="accent1"/>
+                </a:solidFill>
+                <a:latin typeface="Montserrat"/>
+                <a:ea typeface="Montserrat"/>
+                <a:cs typeface="Montserrat"/>
+                <a:sym typeface="Montserrat"/>
+              </a:defRPr>
+            </a:lvl6pPr>
+            <a:lvl7pPr marL="3200400" marR="0" lvl="6" indent="-317500" algn="l" rtl="0">
+              <a:lnSpc>
+                <a:spcPct val="100000"/>
+              </a:lnSpc>
+              <a:spcBef>
+                <a:spcPts val="0"/>
+              </a:spcBef>
+              <a:spcAft>
+                <a:spcPts val="0"/>
+              </a:spcAft>
+              <a:buClr>
+                <a:schemeClr val="accent1"/>
+              </a:buClr>
+              <a:buSzPts val="1400"/>
+              <a:buFont typeface="Montserrat"/>
+              <a:buNone/>
+              <a:defRPr sz="1400" b="0" i="0" u="none" strike="noStrike" cap="none">
+                <a:solidFill>
+                  <a:schemeClr val="accent1"/>
+                </a:solidFill>
+                <a:latin typeface="Montserrat"/>
+                <a:ea typeface="Montserrat"/>
+                <a:cs typeface="Montserrat"/>
+                <a:sym typeface="Montserrat"/>
+              </a:defRPr>
+            </a:lvl7pPr>
+            <a:lvl8pPr marL="3657600" marR="0" lvl="7" indent="-317500" algn="l" rtl="0">
+              <a:lnSpc>
+                <a:spcPct val="100000"/>
+              </a:lnSpc>
+              <a:spcBef>
+                <a:spcPts val="0"/>
+              </a:spcBef>
+              <a:spcAft>
+                <a:spcPts val="0"/>
+              </a:spcAft>
+              <a:buClr>
+                <a:schemeClr val="accent1"/>
+              </a:buClr>
+              <a:buSzPts val="1400"/>
+              <a:buFont typeface="Montserrat"/>
+              <a:buNone/>
+              <a:defRPr sz="1400" b="0" i="0" u="none" strike="noStrike" cap="none">
+                <a:solidFill>
+                  <a:schemeClr val="accent1"/>
+                </a:solidFill>
+                <a:latin typeface="Montserrat"/>
+                <a:ea typeface="Montserrat"/>
+                <a:cs typeface="Montserrat"/>
+                <a:sym typeface="Montserrat"/>
+              </a:defRPr>
+            </a:lvl8pPr>
+            <a:lvl9pPr marL="4114800" marR="0" lvl="8" indent="-317500" algn="l" rtl="0">
+              <a:lnSpc>
+                <a:spcPct val="100000"/>
+              </a:lnSpc>
+              <a:spcBef>
+                <a:spcPts val="0"/>
+              </a:spcBef>
+              <a:spcAft>
+                <a:spcPts val="0"/>
+              </a:spcAft>
+              <a:buClr>
+                <a:schemeClr val="accent1"/>
+              </a:buClr>
+              <a:buSzPts val="1400"/>
+              <a:buFont typeface="Montserrat"/>
+              <a:buNone/>
+              <a:defRPr sz="1400" b="0" i="0" u="none" strike="noStrike" cap="none">
+                <a:solidFill>
+                  <a:schemeClr val="accent1"/>
+                </a:solidFill>
+                <a:latin typeface="Montserrat"/>
+                <a:ea typeface="Montserrat"/>
+                <a:cs typeface="Montserrat"/>
+                <a:sym typeface="Montserrat"/>
+              </a:defRPr>
+            </a:lvl9pPr>
+          </a:lstStyle>
+          <a:p>
+            <a:pPr marL="0" indent="0">
+              <a:buClr>
+                <a:schemeClr val="dk1"/>
+              </a:buClr>
+              <a:buSzPts val="1100"/>
+              <a:buFont typeface="Arial"/>
+              <a:buNone/>
+            </a:pPr>
+            <a:r>
+              <a:rPr lang="es-ES" dirty="0"/>
+              <a:t>Hipótesis</a:t>
+            </a:r>
+          </a:p>
+        </p:txBody>
+      </p:sp>
+      <p:sp>
+        <p:nvSpPr>
+          <p:cNvPr id="3" name="Google Shape;579;p61">
+            <a:extLst>
+              <a:ext uri="{FF2B5EF4-FFF2-40B4-BE49-F238E27FC236}">
+                <a16:creationId xmlns:a16="http://schemas.microsoft.com/office/drawing/2014/main" id="{52B42B7A-0D40-BD52-53EE-D7AED0648423}"/>
+              </a:ext>
+            </a:extLst>
+          </p:cNvPr>
+          <p:cNvSpPr txBox="1">
+            <a:spLocks/>
+          </p:cNvSpPr>
+          <p:nvPr/>
+        </p:nvSpPr>
+        <p:spPr>
+          <a:xfrm>
+            <a:off x="5909000" y="2970621"/>
+            <a:ext cx="2448000" cy="505211"/>
+          </a:xfrm>
+          <a:prstGeom prst="rect">
+            <a:avLst/>
+          </a:prstGeom>
+          <a:noFill/>
+          <a:ln>
+            <a:noFill/>
+          </a:ln>
+        </p:spPr>
+        <p:txBody>
+          <a:bodyPr spcFirstLastPara="1" wrap="square" lIns="91425" tIns="91425" rIns="91425" bIns="91425" anchor="t" anchorCtr="0">
+            <a:noAutofit/>
+          </a:bodyPr>
+          <a:lstStyle>
+            <a:defPPr marR="0" lvl="0" algn="l" rtl="0">
+              <a:lnSpc>
+                <a:spcPct val="100000"/>
+              </a:lnSpc>
+              <a:spcBef>
+                <a:spcPts val="0"/>
+              </a:spcBef>
+              <a:spcAft>
+                <a:spcPts val="0"/>
+              </a:spcAft>
+            </a:defPPr>
+            <a:lvl1pPr marL="457200" marR="0" lvl="0" indent="-317500" algn="l" rtl="0">
+              <a:lnSpc>
+                <a:spcPct val="100000"/>
+              </a:lnSpc>
+              <a:spcBef>
+                <a:spcPts val="0"/>
+              </a:spcBef>
+              <a:spcAft>
+                <a:spcPts val="0"/>
+              </a:spcAft>
+              <a:buClr>
+                <a:schemeClr val="accent1"/>
+              </a:buClr>
+              <a:buSzPts val="1400"/>
+              <a:buFont typeface="Montserrat"/>
+              <a:buNone/>
+              <a:defRPr sz="1400" b="0" i="0" u="none" strike="noStrike" cap="none">
+                <a:solidFill>
+                  <a:schemeClr val="accent1"/>
+                </a:solidFill>
+                <a:latin typeface="Montserrat"/>
+                <a:ea typeface="Montserrat"/>
+                <a:cs typeface="Montserrat"/>
+                <a:sym typeface="Montserrat"/>
+              </a:defRPr>
+            </a:lvl1pPr>
+            <a:lvl2pPr marL="914400" marR="0" lvl="1" indent="-317500" algn="l" rtl="0">
+              <a:lnSpc>
+                <a:spcPct val="100000"/>
+              </a:lnSpc>
+              <a:spcBef>
+                <a:spcPts val="0"/>
+              </a:spcBef>
+              <a:spcAft>
+                <a:spcPts val="0"/>
+              </a:spcAft>
+              <a:buClr>
+                <a:schemeClr val="accent1"/>
+              </a:buClr>
+              <a:buSzPts val="1400"/>
+              <a:buFont typeface="Montserrat"/>
+              <a:buNone/>
+              <a:defRPr sz="1400" b="0" i="0" u="none" strike="noStrike" cap="none">
+                <a:solidFill>
+                  <a:schemeClr val="accent1"/>
+                </a:solidFill>
+                <a:latin typeface="Montserrat"/>
+                <a:ea typeface="Montserrat"/>
+                <a:cs typeface="Montserrat"/>
+                <a:sym typeface="Montserrat"/>
+              </a:defRPr>
+            </a:lvl2pPr>
+            <a:lvl3pPr marL="1371600" marR="0" lvl="2" indent="-317500" algn="l" rtl="0">
+              <a:lnSpc>
+                <a:spcPct val="100000"/>
+              </a:lnSpc>
+              <a:spcBef>
+                <a:spcPts val="0"/>
+              </a:spcBef>
+              <a:spcAft>
+                <a:spcPts val="0"/>
+              </a:spcAft>
+              <a:buClr>
+                <a:schemeClr val="accent1"/>
+              </a:buClr>
+              <a:buSzPts val="1400"/>
+              <a:buFont typeface="Montserrat"/>
+              <a:buNone/>
+              <a:defRPr sz="1400" b="0" i="0" u="none" strike="noStrike" cap="none">
+                <a:solidFill>
+                  <a:schemeClr val="accent1"/>
+                </a:solidFill>
+                <a:latin typeface="Montserrat"/>
+                <a:ea typeface="Montserrat"/>
+                <a:cs typeface="Montserrat"/>
+                <a:sym typeface="Montserrat"/>
+              </a:defRPr>
+            </a:lvl3pPr>
+            <a:lvl4pPr marL="1828800" marR="0" lvl="3" indent="-317500" algn="l" rtl="0">
+              <a:lnSpc>
+                <a:spcPct val="100000"/>
+              </a:lnSpc>
+              <a:spcBef>
+                <a:spcPts val="0"/>
+              </a:spcBef>
+              <a:spcAft>
+                <a:spcPts val="0"/>
+              </a:spcAft>
+              <a:buClr>
+                <a:schemeClr val="accent1"/>
+              </a:buClr>
+              <a:buSzPts val="1400"/>
+              <a:buFont typeface="Montserrat"/>
+              <a:buNone/>
+              <a:defRPr sz="1400" b="0" i="0" u="none" strike="noStrike" cap="none">
+                <a:solidFill>
+                  <a:schemeClr val="accent1"/>
+                </a:solidFill>
+                <a:latin typeface="Montserrat"/>
+                <a:ea typeface="Montserrat"/>
+                <a:cs typeface="Montserrat"/>
+                <a:sym typeface="Montserrat"/>
+              </a:defRPr>
+            </a:lvl4pPr>
+            <a:lvl5pPr marL="2286000" marR="0" lvl="4" indent="-317500" algn="l" rtl="0">
+              <a:lnSpc>
+                <a:spcPct val="100000"/>
+              </a:lnSpc>
+              <a:spcBef>
+                <a:spcPts val="0"/>
+              </a:spcBef>
+              <a:spcAft>
+                <a:spcPts val="0"/>
+              </a:spcAft>
+              <a:buClr>
+                <a:schemeClr val="accent1"/>
+              </a:buClr>
+              <a:buSzPts val="1400"/>
+              <a:buFont typeface="Montserrat"/>
+              <a:buNone/>
+              <a:defRPr sz="1400" b="0" i="0" u="none" strike="noStrike" cap="none">
+                <a:solidFill>
+                  <a:schemeClr val="accent1"/>
+                </a:solidFill>
+                <a:latin typeface="Montserrat"/>
+                <a:ea typeface="Montserrat"/>
+                <a:cs typeface="Montserrat"/>
+                <a:sym typeface="Montserrat"/>
+              </a:defRPr>
+            </a:lvl5pPr>
+            <a:lvl6pPr marL="2743200" marR="0" lvl="5" indent="-317500" algn="l" rtl="0">
+              <a:lnSpc>
+                <a:spcPct val="100000"/>
+              </a:lnSpc>
+              <a:spcBef>
+                <a:spcPts val="0"/>
+              </a:spcBef>
+              <a:spcAft>
+                <a:spcPts val="0"/>
+              </a:spcAft>
+              <a:buClr>
+                <a:schemeClr val="accent1"/>
+              </a:buClr>
+              <a:buSzPts val="1400"/>
+              <a:buFont typeface="Montserrat"/>
+              <a:buNone/>
+              <a:defRPr sz="1400" b="0" i="0" u="none" strike="noStrike" cap="none">
+                <a:solidFill>
+                  <a:schemeClr val="accent1"/>
+                </a:solidFill>
+                <a:latin typeface="Montserrat"/>
+                <a:ea typeface="Montserrat"/>
+                <a:cs typeface="Montserrat"/>
+                <a:sym typeface="Montserrat"/>
+              </a:defRPr>
+            </a:lvl6pPr>
+            <a:lvl7pPr marL="3200400" marR="0" lvl="6" indent="-317500" algn="l" rtl="0">
+              <a:lnSpc>
+                <a:spcPct val="100000"/>
+              </a:lnSpc>
+              <a:spcBef>
+                <a:spcPts val="0"/>
+              </a:spcBef>
+              <a:spcAft>
+                <a:spcPts val="0"/>
+              </a:spcAft>
+              <a:buClr>
+                <a:schemeClr val="accent1"/>
+              </a:buClr>
+              <a:buSzPts val="1400"/>
+              <a:buFont typeface="Montserrat"/>
+              <a:buNone/>
+              <a:defRPr sz="1400" b="0" i="0" u="none" strike="noStrike" cap="none">
+                <a:solidFill>
+                  <a:schemeClr val="accent1"/>
+                </a:solidFill>
+                <a:latin typeface="Montserrat"/>
+                <a:ea typeface="Montserrat"/>
+                <a:cs typeface="Montserrat"/>
+                <a:sym typeface="Montserrat"/>
+              </a:defRPr>
+            </a:lvl7pPr>
+            <a:lvl8pPr marL="3657600" marR="0" lvl="7" indent="-317500" algn="l" rtl="0">
+              <a:lnSpc>
+                <a:spcPct val="100000"/>
+              </a:lnSpc>
+              <a:spcBef>
+                <a:spcPts val="0"/>
+              </a:spcBef>
+              <a:spcAft>
+                <a:spcPts val="0"/>
+              </a:spcAft>
+              <a:buClr>
+                <a:schemeClr val="accent1"/>
+              </a:buClr>
+              <a:buSzPts val="1400"/>
+              <a:buFont typeface="Montserrat"/>
+              <a:buNone/>
+              <a:defRPr sz="1400" b="0" i="0" u="none" strike="noStrike" cap="none">
+                <a:solidFill>
+                  <a:schemeClr val="accent1"/>
+                </a:solidFill>
+                <a:latin typeface="Montserrat"/>
+                <a:ea typeface="Montserrat"/>
+                <a:cs typeface="Montserrat"/>
+                <a:sym typeface="Montserrat"/>
+              </a:defRPr>
+            </a:lvl8pPr>
+            <a:lvl9pPr marL="4114800" marR="0" lvl="8" indent="-317500" algn="l" rtl="0">
+              <a:lnSpc>
+                <a:spcPct val="100000"/>
+              </a:lnSpc>
+              <a:spcBef>
+                <a:spcPts val="0"/>
+              </a:spcBef>
+              <a:spcAft>
+                <a:spcPts val="0"/>
+              </a:spcAft>
+              <a:buClr>
+                <a:schemeClr val="accent1"/>
+              </a:buClr>
+              <a:buSzPts val="1400"/>
+              <a:buFont typeface="Montserrat"/>
+              <a:buNone/>
+              <a:defRPr sz="1400" b="0" i="0" u="none" strike="noStrike" cap="none">
+                <a:solidFill>
+                  <a:schemeClr val="accent1"/>
+                </a:solidFill>
+                <a:latin typeface="Montserrat"/>
+                <a:ea typeface="Montserrat"/>
+                <a:cs typeface="Montserrat"/>
+                <a:sym typeface="Montserrat"/>
+              </a:defRPr>
+            </a:lvl9pPr>
+          </a:lstStyle>
+          <a:p>
+            <a:pPr marL="0" indent="0">
+              <a:buClr>
+                <a:schemeClr val="dk1"/>
+              </a:buClr>
+              <a:buSzPts val="1100"/>
+              <a:buFont typeface="Arial"/>
+              <a:buNone/>
+            </a:pPr>
+            <a:r>
+              <a:rPr lang="es-ES" dirty="0"/>
+              <a:t>Respondiendo 4 preguntas principales</a:t>
+            </a:r>
+            <a:endParaRPr lang="en-US" dirty="0"/>
+          </a:p>
+        </p:txBody>
+      </p:sp>
+      <p:sp>
+        <p:nvSpPr>
+          <p:cNvPr id="4" name="Google Shape;584;p61">
+            <a:extLst>
+              <a:ext uri="{FF2B5EF4-FFF2-40B4-BE49-F238E27FC236}">
+                <a16:creationId xmlns:a16="http://schemas.microsoft.com/office/drawing/2014/main" id="{24A3B783-A41A-CB60-9995-46282DB3BB72}"/>
+              </a:ext>
+            </a:extLst>
+          </p:cNvPr>
+          <p:cNvSpPr txBox="1">
+            <a:spLocks/>
+          </p:cNvSpPr>
+          <p:nvPr/>
+        </p:nvSpPr>
+        <p:spPr>
+          <a:xfrm>
+            <a:off x="4887550" y="2654743"/>
+            <a:ext cx="821100" cy="821100"/>
+          </a:xfrm>
+          <a:prstGeom prst="rect">
+            <a:avLst/>
+          </a:prstGeom>
+          <a:noFill/>
+          <a:ln>
+            <a:noFill/>
+          </a:ln>
+        </p:spPr>
+        <p:txBody>
+          <a:bodyPr spcFirstLastPara="1" wrap="square" lIns="91425" tIns="91425" rIns="91425" bIns="91425" anchor="t" anchorCtr="0">
+            <a:noAutofit/>
+          </a:bodyPr>
+          <a:lstStyle>
+            <a:defPPr marR="0" lvl="0" algn="l" rtl="0">
+              <a:lnSpc>
+                <a:spcPct val="100000"/>
+              </a:lnSpc>
+              <a:spcBef>
+                <a:spcPts val="0"/>
+              </a:spcBef>
+              <a:spcAft>
+                <a:spcPts val="0"/>
+              </a:spcAft>
+            </a:defPPr>
+            <a:lvl1pPr marR="0" lvl="0" algn="l" rtl="0">
+              <a:lnSpc>
+                <a:spcPct val="100000"/>
+              </a:lnSpc>
+              <a:spcBef>
+                <a:spcPts val="0"/>
+              </a:spcBef>
+              <a:spcAft>
+                <a:spcPts val="0"/>
+              </a:spcAft>
+              <a:buClr>
+                <a:schemeClr val="lt1"/>
+              </a:buClr>
+              <a:buSzPts val="3000"/>
+              <a:buFont typeface="Montserrat"/>
+              <a:buNone/>
+              <a:defRPr sz="3000" b="1" i="0" u="none" strike="noStrike" cap="none">
+                <a:solidFill>
+                  <a:schemeClr val="lt1"/>
+                </a:solidFill>
+                <a:latin typeface="Montserrat"/>
+                <a:ea typeface="Montserrat"/>
+                <a:cs typeface="Montserrat"/>
+                <a:sym typeface="Montserrat"/>
+              </a:defRPr>
+            </a:lvl1pPr>
+            <a:lvl2pPr marR="0" lvl="1" algn="l" rtl="0">
+              <a:lnSpc>
+                <a:spcPct val="100000"/>
+              </a:lnSpc>
+              <a:spcBef>
+                <a:spcPts val="0"/>
+              </a:spcBef>
+              <a:spcAft>
+                <a:spcPts val="0"/>
+              </a:spcAft>
+              <a:buClr>
+                <a:schemeClr val="dk1"/>
+              </a:buClr>
+              <a:buSzPts val="2800"/>
+              <a:buFont typeface="Arial"/>
+              <a:buNone/>
+              <a:defRPr sz="2800" b="0" i="0" u="none" strike="noStrike" cap="none">
+                <a:solidFill>
+                  <a:schemeClr val="dk1"/>
+                </a:solidFill>
+                <a:latin typeface="Arial"/>
+                <a:ea typeface="Arial"/>
+                <a:cs typeface="Arial"/>
+                <a:sym typeface="Arial"/>
+              </a:defRPr>
+            </a:lvl2pPr>
+            <a:lvl3pPr marR="0" lvl="2" algn="l" rtl="0">
+              <a:lnSpc>
+                <a:spcPct val="100000"/>
+              </a:lnSpc>
+              <a:spcBef>
+                <a:spcPts val="0"/>
+              </a:spcBef>
+              <a:spcAft>
+                <a:spcPts val="0"/>
+              </a:spcAft>
+              <a:buClr>
+                <a:schemeClr val="dk1"/>
+              </a:buClr>
+              <a:buSzPts val="2800"/>
+              <a:buFont typeface="Arial"/>
+              <a:buNone/>
+              <a:defRPr sz="2800" b="0" i="0" u="none" strike="noStrike" cap="none">
+                <a:solidFill>
+                  <a:schemeClr val="dk1"/>
+                </a:solidFill>
+                <a:latin typeface="Arial"/>
+                <a:ea typeface="Arial"/>
+                <a:cs typeface="Arial"/>
+                <a:sym typeface="Arial"/>
+              </a:defRPr>
+            </a:lvl3pPr>
+            <a:lvl4pPr marR="0" lvl="3" algn="l" rtl="0">
+              <a:lnSpc>
+                <a:spcPct val="100000"/>
+              </a:lnSpc>
+              <a:spcBef>
+                <a:spcPts val="0"/>
+              </a:spcBef>
+              <a:spcAft>
+                <a:spcPts val="0"/>
+              </a:spcAft>
+              <a:buClr>
+                <a:schemeClr val="dk1"/>
+              </a:buClr>
+              <a:buSzPts val="2800"/>
+              <a:buFont typeface="Arial"/>
+              <a:buNone/>
+              <a:defRPr sz="2800" b="0" i="0" u="none" strike="noStrike" cap="none">
+                <a:solidFill>
+                  <a:schemeClr val="dk1"/>
+                </a:solidFill>
+                <a:latin typeface="Arial"/>
+                <a:ea typeface="Arial"/>
+                <a:cs typeface="Arial"/>
+                <a:sym typeface="Arial"/>
+              </a:defRPr>
+            </a:lvl4pPr>
+            <a:lvl5pPr marR="0" lvl="4" algn="l" rtl="0">
+              <a:lnSpc>
+                <a:spcPct val="100000"/>
+              </a:lnSpc>
+              <a:spcBef>
+                <a:spcPts val="0"/>
+              </a:spcBef>
+              <a:spcAft>
+                <a:spcPts val="0"/>
+              </a:spcAft>
+              <a:buClr>
+                <a:schemeClr val="dk1"/>
+              </a:buClr>
+              <a:buSzPts val="2800"/>
+              <a:buFont typeface="Arial"/>
+              <a:buNone/>
+              <a:defRPr sz="2800" b="0" i="0" u="none" strike="noStrike" cap="none">
+                <a:solidFill>
+                  <a:schemeClr val="dk1"/>
+                </a:solidFill>
+                <a:latin typeface="Arial"/>
+                <a:ea typeface="Arial"/>
+                <a:cs typeface="Arial"/>
+                <a:sym typeface="Arial"/>
+              </a:defRPr>
+            </a:lvl5pPr>
+            <a:lvl6pPr marR="0" lvl="5" algn="l" rtl="0">
+              <a:lnSpc>
+                <a:spcPct val="100000"/>
+              </a:lnSpc>
+              <a:spcBef>
+                <a:spcPts val="0"/>
+              </a:spcBef>
+              <a:spcAft>
+                <a:spcPts val="0"/>
+              </a:spcAft>
+              <a:buClr>
+                <a:schemeClr val="dk1"/>
+              </a:buClr>
+              <a:buSzPts val="2800"/>
+              <a:buFont typeface="Arial"/>
+              <a:buNone/>
+              <a:defRPr sz="2800" b="0" i="0" u="none" strike="noStrike" cap="none">
+                <a:solidFill>
+                  <a:schemeClr val="dk1"/>
+                </a:solidFill>
+                <a:latin typeface="Arial"/>
+                <a:ea typeface="Arial"/>
+                <a:cs typeface="Arial"/>
+                <a:sym typeface="Arial"/>
+              </a:defRPr>
+            </a:lvl6pPr>
+            <a:lvl7pPr marR="0" lvl="6" algn="l" rtl="0">
+              <a:lnSpc>
+                <a:spcPct val="100000"/>
+              </a:lnSpc>
+              <a:spcBef>
+                <a:spcPts val="0"/>
+              </a:spcBef>
+              <a:spcAft>
+                <a:spcPts val="0"/>
+              </a:spcAft>
+              <a:buClr>
+                <a:schemeClr val="dk1"/>
+              </a:buClr>
+              <a:buSzPts val="2800"/>
+              <a:buFont typeface="Arial"/>
+              <a:buNone/>
+              <a:defRPr sz="2800" b="0" i="0" u="none" strike="noStrike" cap="none">
+                <a:solidFill>
+                  <a:schemeClr val="dk1"/>
+                </a:solidFill>
+                <a:latin typeface="Arial"/>
+                <a:ea typeface="Arial"/>
+                <a:cs typeface="Arial"/>
+                <a:sym typeface="Arial"/>
+              </a:defRPr>
+            </a:lvl7pPr>
+            <a:lvl8pPr marR="0" lvl="7" algn="l" rtl="0">
+              <a:lnSpc>
+                <a:spcPct val="100000"/>
+              </a:lnSpc>
+              <a:spcBef>
+                <a:spcPts val="0"/>
+              </a:spcBef>
+              <a:spcAft>
+                <a:spcPts val="0"/>
+              </a:spcAft>
+              <a:buClr>
+                <a:schemeClr val="dk1"/>
+              </a:buClr>
+              <a:buSzPts val="2800"/>
+              <a:buFont typeface="Arial"/>
+              <a:buNone/>
+              <a:defRPr sz="2800" b="0" i="0" u="none" strike="noStrike" cap="none">
+                <a:solidFill>
+                  <a:schemeClr val="dk1"/>
+                </a:solidFill>
+                <a:latin typeface="Arial"/>
+                <a:ea typeface="Arial"/>
+                <a:cs typeface="Arial"/>
+                <a:sym typeface="Arial"/>
+              </a:defRPr>
+            </a:lvl8pPr>
+            <a:lvl9pPr marR="0" lvl="8" algn="l" rtl="0">
+              <a:lnSpc>
+                <a:spcPct val="100000"/>
+              </a:lnSpc>
+              <a:spcBef>
+                <a:spcPts val="0"/>
+              </a:spcBef>
+              <a:spcAft>
+                <a:spcPts val="0"/>
+              </a:spcAft>
+              <a:buClr>
+                <a:schemeClr val="dk1"/>
+              </a:buClr>
+              <a:buSzPts val="2800"/>
+              <a:buFont typeface="Arial"/>
+              <a:buNone/>
+              <a:defRPr sz="2800" b="0" i="0" u="none" strike="noStrike" cap="none">
+                <a:solidFill>
+                  <a:schemeClr val="dk1"/>
+                </a:solidFill>
+                <a:latin typeface="Arial"/>
+                <a:ea typeface="Arial"/>
+                <a:cs typeface="Arial"/>
+                <a:sym typeface="Arial"/>
+              </a:defRPr>
+            </a:lvl9pPr>
+          </a:lstStyle>
+          <a:p>
+            <a:r>
+              <a:rPr lang="en"/>
+              <a:t>2.</a:t>
+            </a:r>
+          </a:p>
+        </p:txBody>
+      </p:sp>
+      <p:sp>
+        <p:nvSpPr>
+          <p:cNvPr id="5" name="Google Shape;586;p61">
+            <a:extLst>
+              <a:ext uri="{FF2B5EF4-FFF2-40B4-BE49-F238E27FC236}">
+                <a16:creationId xmlns:a16="http://schemas.microsoft.com/office/drawing/2014/main" id="{E0428A5D-903A-AA34-4BEA-0200AD9A6509}"/>
+              </a:ext>
+            </a:extLst>
+          </p:cNvPr>
+          <p:cNvSpPr/>
+          <p:nvPr/>
+        </p:nvSpPr>
+        <p:spPr>
+          <a:xfrm>
+            <a:off x="4887550" y="2612732"/>
+            <a:ext cx="821100" cy="821100"/>
+          </a:xfrm>
+          <a:prstGeom prst="round1Rect">
+            <a:avLst>
+              <a:gd name="adj" fmla="val 16667"/>
+            </a:avLst>
+          </a:prstGeom>
+          <a:solidFill>
+            <a:schemeClr val="accent5"/>
+          </a:solidFill>
+          <a:ln>
+            <a:noFill/>
+          </a:ln>
+        </p:spPr>
+        <p:txBody>
+          <a:bodyPr spcFirstLastPara="1" wrap="square" lIns="91425" tIns="91425" rIns="91425" bIns="91425" anchor="ctr" anchorCtr="0">
+            <a:noAutofit/>
+          </a:bodyPr>
+          <a:lstStyle/>
+          <a:p>
+            <a:pPr marL="0" lvl="0" indent="0" algn="l" rtl="0">
+              <a:lnSpc>
+                <a:spcPct val="100000"/>
+              </a:lnSpc>
+              <a:spcBef>
+                <a:spcPts val="0"/>
+              </a:spcBef>
+              <a:spcAft>
+                <a:spcPts val="0"/>
+              </a:spcAft>
+              <a:buNone/>
+            </a:pPr>
+            <a:endParaRPr/>
+          </a:p>
+        </p:txBody>
+      </p:sp>
+      <p:sp>
+        <p:nvSpPr>
+          <p:cNvPr id="6" name="Google Shape;590;p61">
+            <a:extLst>
+              <a:ext uri="{FF2B5EF4-FFF2-40B4-BE49-F238E27FC236}">
+                <a16:creationId xmlns:a16="http://schemas.microsoft.com/office/drawing/2014/main" id="{77F84C63-7D7C-FE04-F550-A5E5161C3E6B}"/>
+              </a:ext>
+            </a:extLst>
+          </p:cNvPr>
+          <p:cNvSpPr txBox="1">
+            <a:spLocks/>
+          </p:cNvSpPr>
+          <p:nvPr/>
+        </p:nvSpPr>
+        <p:spPr>
+          <a:xfrm>
+            <a:off x="4887550" y="2723132"/>
+            <a:ext cx="821100" cy="600300"/>
+          </a:xfrm>
+          <a:prstGeom prst="rect">
+            <a:avLst/>
+          </a:prstGeom>
+          <a:noFill/>
+          <a:ln>
+            <a:noFill/>
+          </a:ln>
+        </p:spPr>
+        <p:txBody>
+          <a:bodyPr spcFirstLastPara="1" wrap="square" lIns="91425" tIns="91425" rIns="91425" bIns="91425" anchor="ctr" anchorCtr="0">
+            <a:noAutofit/>
+          </a:bodyPr>
+          <a:lstStyle>
+            <a:defPPr marR="0" lvl="0" algn="l" rtl="0">
+              <a:lnSpc>
+                <a:spcPct val="100000"/>
+              </a:lnSpc>
+              <a:spcBef>
+                <a:spcPts val="0"/>
+              </a:spcBef>
+              <a:spcAft>
+                <a:spcPts val="0"/>
+              </a:spcAft>
+            </a:defPPr>
+            <a:lvl1pPr marR="0" lvl="0" algn="l" rtl="0">
+              <a:lnSpc>
+                <a:spcPct val="100000"/>
+              </a:lnSpc>
+              <a:spcBef>
+                <a:spcPts val="0"/>
+              </a:spcBef>
+              <a:spcAft>
+                <a:spcPts val="0"/>
+              </a:spcAft>
+              <a:buClr>
+                <a:schemeClr val="lt1"/>
+              </a:buClr>
+              <a:buSzPts val="3000"/>
+              <a:buFont typeface="Montserrat"/>
+              <a:buNone/>
+              <a:defRPr sz="3000" b="1" i="0" u="none" strike="noStrike" cap="none">
+                <a:solidFill>
+                  <a:schemeClr val="lt1"/>
+                </a:solidFill>
+                <a:latin typeface="Montserrat"/>
+                <a:ea typeface="Montserrat"/>
+                <a:cs typeface="Montserrat"/>
+                <a:sym typeface="Montserrat"/>
+              </a:defRPr>
+            </a:lvl1pPr>
+            <a:lvl2pPr marR="0" lvl="1" algn="l" rtl="0">
+              <a:lnSpc>
+                <a:spcPct val="100000"/>
+              </a:lnSpc>
+              <a:spcBef>
+                <a:spcPts val="0"/>
+              </a:spcBef>
+              <a:spcAft>
+                <a:spcPts val="0"/>
+              </a:spcAft>
+              <a:buClr>
+                <a:schemeClr val="dk1"/>
+              </a:buClr>
+              <a:buSzPts val="2800"/>
+              <a:buFont typeface="Arial"/>
+              <a:buNone/>
+              <a:defRPr sz="2800" b="0" i="0" u="none" strike="noStrike" cap="none">
+                <a:solidFill>
+                  <a:schemeClr val="dk1"/>
+                </a:solidFill>
+                <a:latin typeface="Arial"/>
+                <a:ea typeface="Arial"/>
+                <a:cs typeface="Arial"/>
+                <a:sym typeface="Arial"/>
+              </a:defRPr>
+            </a:lvl2pPr>
+            <a:lvl3pPr marR="0" lvl="2" algn="l" rtl="0">
+              <a:lnSpc>
+                <a:spcPct val="100000"/>
+              </a:lnSpc>
+              <a:spcBef>
+                <a:spcPts val="0"/>
+              </a:spcBef>
+              <a:spcAft>
+                <a:spcPts val="0"/>
+              </a:spcAft>
+              <a:buClr>
+                <a:schemeClr val="dk1"/>
+              </a:buClr>
+              <a:buSzPts val="2800"/>
+              <a:buFont typeface="Arial"/>
+              <a:buNone/>
+              <a:defRPr sz="2800" b="0" i="0" u="none" strike="noStrike" cap="none">
+                <a:solidFill>
+                  <a:schemeClr val="dk1"/>
+                </a:solidFill>
+                <a:latin typeface="Arial"/>
+                <a:ea typeface="Arial"/>
+                <a:cs typeface="Arial"/>
+                <a:sym typeface="Arial"/>
+              </a:defRPr>
+            </a:lvl3pPr>
+            <a:lvl4pPr marR="0" lvl="3" algn="l" rtl="0">
+              <a:lnSpc>
+                <a:spcPct val="100000"/>
+              </a:lnSpc>
+              <a:spcBef>
+                <a:spcPts val="0"/>
+              </a:spcBef>
+              <a:spcAft>
+                <a:spcPts val="0"/>
+              </a:spcAft>
+              <a:buClr>
+                <a:schemeClr val="dk1"/>
+              </a:buClr>
+              <a:buSzPts val="2800"/>
+              <a:buFont typeface="Arial"/>
+              <a:buNone/>
+              <a:defRPr sz="2800" b="0" i="0" u="none" strike="noStrike" cap="none">
+                <a:solidFill>
+                  <a:schemeClr val="dk1"/>
+                </a:solidFill>
+                <a:latin typeface="Arial"/>
+                <a:ea typeface="Arial"/>
+                <a:cs typeface="Arial"/>
+                <a:sym typeface="Arial"/>
+              </a:defRPr>
+            </a:lvl4pPr>
+            <a:lvl5pPr marR="0" lvl="4" algn="l" rtl="0">
+              <a:lnSpc>
+                <a:spcPct val="100000"/>
+              </a:lnSpc>
+              <a:spcBef>
+                <a:spcPts val="0"/>
+              </a:spcBef>
+              <a:spcAft>
+                <a:spcPts val="0"/>
+              </a:spcAft>
+              <a:buClr>
+                <a:schemeClr val="dk1"/>
+              </a:buClr>
+              <a:buSzPts val="2800"/>
+              <a:buFont typeface="Arial"/>
+              <a:buNone/>
+              <a:defRPr sz="2800" b="0" i="0" u="none" strike="noStrike" cap="none">
+                <a:solidFill>
+                  <a:schemeClr val="dk1"/>
+                </a:solidFill>
+                <a:latin typeface="Arial"/>
+                <a:ea typeface="Arial"/>
+                <a:cs typeface="Arial"/>
+                <a:sym typeface="Arial"/>
+              </a:defRPr>
+            </a:lvl5pPr>
+            <a:lvl6pPr marR="0" lvl="5" algn="l" rtl="0">
+              <a:lnSpc>
+                <a:spcPct val="100000"/>
+              </a:lnSpc>
+              <a:spcBef>
+                <a:spcPts val="0"/>
+              </a:spcBef>
+              <a:spcAft>
+                <a:spcPts val="0"/>
+              </a:spcAft>
+              <a:buClr>
+                <a:schemeClr val="dk1"/>
+              </a:buClr>
+              <a:buSzPts val="2800"/>
+              <a:buFont typeface="Arial"/>
+              <a:buNone/>
+              <a:defRPr sz="2800" b="0" i="0" u="none" strike="noStrike" cap="none">
+                <a:solidFill>
+                  <a:schemeClr val="dk1"/>
+                </a:solidFill>
+                <a:latin typeface="Arial"/>
+                <a:ea typeface="Arial"/>
+                <a:cs typeface="Arial"/>
+                <a:sym typeface="Arial"/>
+              </a:defRPr>
+            </a:lvl6pPr>
+            <a:lvl7pPr marR="0" lvl="6" algn="l" rtl="0">
+              <a:lnSpc>
+                <a:spcPct val="100000"/>
+              </a:lnSpc>
+              <a:spcBef>
+                <a:spcPts val="0"/>
+              </a:spcBef>
+              <a:spcAft>
+                <a:spcPts val="0"/>
+              </a:spcAft>
+              <a:buClr>
+                <a:schemeClr val="dk1"/>
+              </a:buClr>
+              <a:buSzPts val="2800"/>
+              <a:buFont typeface="Arial"/>
+              <a:buNone/>
+              <a:defRPr sz="2800" b="0" i="0" u="none" strike="noStrike" cap="none">
+                <a:solidFill>
+                  <a:schemeClr val="dk1"/>
+                </a:solidFill>
+                <a:latin typeface="Arial"/>
+                <a:ea typeface="Arial"/>
+                <a:cs typeface="Arial"/>
+                <a:sym typeface="Arial"/>
+              </a:defRPr>
+            </a:lvl7pPr>
+            <a:lvl8pPr marR="0" lvl="7" algn="l" rtl="0">
+              <a:lnSpc>
+                <a:spcPct val="100000"/>
+              </a:lnSpc>
+              <a:spcBef>
+                <a:spcPts val="0"/>
+              </a:spcBef>
+              <a:spcAft>
+                <a:spcPts val="0"/>
+              </a:spcAft>
+              <a:buClr>
+                <a:schemeClr val="dk1"/>
+              </a:buClr>
+              <a:buSzPts val="2800"/>
+              <a:buFont typeface="Arial"/>
+              <a:buNone/>
+              <a:defRPr sz="2800" b="0" i="0" u="none" strike="noStrike" cap="none">
+                <a:solidFill>
+                  <a:schemeClr val="dk1"/>
+                </a:solidFill>
+                <a:latin typeface="Arial"/>
+                <a:ea typeface="Arial"/>
+                <a:cs typeface="Arial"/>
+                <a:sym typeface="Arial"/>
+              </a:defRPr>
+            </a:lvl8pPr>
+            <a:lvl9pPr marR="0" lvl="8" algn="l" rtl="0">
+              <a:lnSpc>
+                <a:spcPct val="100000"/>
+              </a:lnSpc>
+              <a:spcBef>
+                <a:spcPts val="0"/>
+              </a:spcBef>
+              <a:spcAft>
+                <a:spcPts val="0"/>
+              </a:spcAft>
+              <a:buClr>
+                <a:schemeClr val="dk1"/>
+              </a:buClr>
+              <a:buSzPts val="2800"/>
+              <a:buFont typeface="Arial"/>
+              <a:buNone/>
+              <a:defRPr sz="2800" b="0" i="0" u="none" strike="noStrike" cap="none">
+                <a:solidFill>
+                  <a:schemeClr val="dk1"/>
+                </a:solidFill>
+                <a:latin typeface="Arial"/>
+                <a:ea typeface="Arial"/>
+                <a:cs typeface="Arial"/>
+                <a:sym typeface="Arial"/>
+              </a:defRPr>
+            </a:lvl9pPr>
+          </a:lstStyle>
+          <a:p>
+            <a:pPr algn="ctr"/>
+            <a:r>
+              <a:rPr lang="en" dirty="0"/>
+              <a:t>3</a:t>
+            </a:r>
+          </a:p>
+        </p:txBody>
+      </p:sp>
+    </p:spTree>
+  </p:cSld>
+  <p:clrMapOvr>
+    <a:masterClrMapping/>
+  </p:clrMapOvr>
+</p:sld>
+</file>
+
+<file path=ppt/slides/slide20.xml><?xml version="1.0" encoding="utf-8"?>
 <p:sld xmlns:a="http://schemas.openxmlformats.org/drawingml/2006/main" xmlns:r="http://schemas.openxmlformats.org/officeDocument/2006/relationships" xmlns:p="http://schemas.openxmlformats.org/presentationml/2006/main">
   <p:cSld>
     <p:spTree>
@@ -13511,1967 +16194,6 @@
 </p:sld>
 </file>
 
-<file path=ppt/slides/slide2.xml><?xml version="1.0" encoding="utf-8"?>
-<p:sld xmlns:a="http://schemas.openxmlformats.org/drawingml/2006/main" xmlns:r="http://schemas.openxmlformats.org/officeDocument/2006/relationships" xmlns:p="http://schemas.openxmlformats.org/presentationml/2006/main">
-  <p:cSld>
-    <p:spTree>
-      <p:nvGrpSpPr>
-        <p:cNvPr id="1" name="Shape 575"/>
-        <p:cNvGrpSpPr/>
-        <p:nvPr/>
-      </p:nvGrpSpPr>
-      <p:grpSpPr>
-        <a:xfrm>
-          <a:off x="0" y="0"/>
-          <a:ext cx="0" cy="0"/>
-          <a:chOff x="0" y="0"/>
-          <a:chExt cx="0" cy="0"/>
-        </a:xfrm>
-      </p:grpSpPr>
-      <p:sp>
-        <p:nvSpPr>
-          <p:cNvPr id="576" name="Google Shape;576;p61"/>
-          <p:cNvSpPr txBox="1">
-            <a:spLocks noGrp="1"/>
-          </p:cNvSpPr>
-          <p:nvPr>
-            <p:ph type="subTitle" idx="1"/>
-          </p:nvPr>
-        </p:nvSpPr>
-        <p:spPr>
-          <a:xfrm>
-            <a:off x="5909000" y="188144"/>
-            <a:ext cx="2448000" cy="359100"/>
-          </a:xfrm>
-          <a:prstGeom prst="rect">
-            <a:avLst/>
-          </a:prstGeom>
-        </p:spPr>
-        <p:txBody>
-          <a:bodyPr spcFirstLastPara="1" wrap="square" lIns="91425" tIns="91425" rIns="91425" bIns="91425" anchor="t" anchorCtr="0">
-            <a:noAutofit/>
-          </a:bodyPr>
-          <a:lstStyle/>
-          <a:p>
-            <a:pPr marL="0" lvl="0" indent="0" algn="l" rtl="0">
-              <a:spcBef>
-                <a:spcPts val="0"/>
-              </a:spcBef>
-              <a:spcAft>
-                <a:spcPts val="0"/>
-              </a:spcAft>
-              <a:buClr>
-                <a:schemeClr val="dk1"/>
-              </a:buClr>
-              <a:buSzPts val="1100"/>
-              <a:buFont typeface="Arial"/>
-              <a:buNone/>
-            </a:pPr>
-            <a:r>
-              <a:rPr lang="es-ES" dirty="0"/>
-              <a:t>Contexto</a:t>
-            </a:r>
-            <a:endParaRPr dirty="0"/>
-          </a:p>
-          <a:p>
-            <a:pPr marL="0" lvl="0" indent="0" algn="l" rtl="0">
-              <a:spcBef>
-                <a:spcPts val="0"/>
-              </a:spcBef>
-              <a:spcAft>
-                <a:spcPts val="0"/>
-              </a:spcAft>
-              <a:buNone/>
-            </a:pPr>
-            <a:endParaRPr dirty="0"/>
-          </a:p>
-        </p:txBody>
-      </p:sp>
-      <p:sp>
-        <p:nvSpPr>
-          <p:cNvPr id="577" name="Google Shape;577;p61"/>
-          <p:cNvSpPr txBox="1">
-            <a:spLocks noGrp="1"/>
-          </p:cNvSpPr>
-          <p:nvPr>
-            <p:ph type="subTitle" idx="2"/>
-          </p:nvPr>
-        </p:nvSpPr>
-        <p:spPr>
-          <a:xfrm>
-            <a:off x="5909000" y="582129"/>
-            <a:ext cx="2603098" cy="821100"/>
-          </a:xfrm>
-          <a:prstGeom prst="rect">
-            <a:avLst/>
-          </a:prstGeom>
-        </p:spPr>
-        <p:txBody>
-          <a:bodyPr spcFirstLastPara="1" wrap="square" lIns="91425" tIns="91425" rIns="91425" bIns="91425" anchor="t" anchorCtr="0">
-            <a:noAutofit/>
-          </a:bodyPr>
-          <a:lstStyle/>
-          <a:p>
-            <a:pPr marL="0" lvl="0" indent="0" algn="l" rtl="0">
-              <a:spcBef>
-                <a:spcPts val="0"/>
-              </a:spcBef>
-              <a:spcAft>
-                <a:spcPts val="0"/>
-              </a:spcAft>
-              <a:buClr>
-                <a:schemeClr val="dk1"/>
-              </a:buClr>
-              <a:buSzPts val="1100"/>
-              <a:buFont typeface="Arial"/>
-              <a:buNone/>
-            </a:pPr>
-            <a:r>
-              <a:rPr lang="en" dirty="0"/>
-              <a:t>Actualidad en el entorno laboral para universitarios</a:t>
-            </a:r>
-            <a:endParaRPr dirty="0"/>
-          </a:p>
-        </p:txBody>
-      </p:sp>
-      <p:sp>
-        <p:nvSpPr>
-          <p:cNvPr id="578" name="Google Shape;578;p61"/>
-          <p:cNvSpPr txBox="1">
-            <a:spLocks noGrp="1"/>
-          </p:cNvSpPr>
-          <p:nvPr>
-            <p:ph type="subTitle" idx="3"/>
-          </p:nvPr>
-        </p:nvSpPr>
-        <p:spPr>
-          <a:xfrm>
-            <a:off x="5909000" y="1334158"/>
-            <a:ext cx="2448000" cy="359100"/>
-          </a:xfrm>
-          <a:prstGeom prst="rect">
-            <a:avLst/>
-          </a:prstGeom>
-        </p:spPr>
-        <p:txBody>
-          <a:bodyPr spcFirstLastPara="1" wrap="square" lIns="91425" tIns="91425" rIns="91425" bIns="91425" anchor="t" anchorCtr="0">
-            <a:noAutofit/>
-          </a:bodyPr>
-          <a:lstStyle/>
-          <a:p>
-            <a:pPr marL="0" lvl="0" indent="0" algn="l" rtl="0">
-              <a:spcBef>
-                <a:spcPts val="0"/>
-              </a:spcBef>
-              <a:spcAft>
-                <a:spcPts val="0"/>
-              </a:spcAft>
-              <a:buClr>
-                <a:schemeClr val="dk1"/>
-              </a:buClr>
-              <a:buSzPts val="1100"/>
-              <a:buFont typeface="Arial"/>
-              <a:buNone/>
-            </a:pPr>
-            <a:r>
-              <a:rPr lang="en" dirty="0"/>
-              <a:t>Datos</a:t>
-            </a:r>
-            <a:endParaRPr dirty="0"/>
-          </a:p>
-        </p:txBody>
-      </p:sp>
-      <p:sp>
-        <p:nvSpPr>
-          <p:cNvPr id="579" name="Google Shape;579;p61"/>
-          <p:cNvSpPr txBox="1">
-            <a:spLocks noGrp="1"/>
-          </p:cNvSpPr>
-          <p:nvPr>
-            <p:ph type="subTitle" idx="4"/>
-          </p:nvPr>
-        </p:nvSpPr>
-        <p:spPr>
-          <a:xfrm>
-            <a:off x="5909000" y="1750650"/>
-            <a:ext cx="2448000" cy="821100"/>
-          </a:xfrm>
-          <a:prstGeom prst="rect">
-            <a:avLst/>
-          </a:prstGeom>
-        </p:spPr>
-        <p:txBody>
-          <a:bodyPr spcFirstLastPara="1" wrap="square" lIns="91425" tIns="91425" rIns="91425" bIns="91425" anchor="t" anchorCtr="0">
-            <a:noAutofit/>
-          </a:bodyPr>
-          <a:lstStyle/>
-          <a:p>
-            <a:pPr marL="0" lvl="0" indent="0" algn="l" rtl="0">
-              <a:spcBef>
-                <a:spcPts val="0"/>
-              </a:spcBef>
-              <a:spcAft>
-                <a:spcPts val="0"/>
-              </a:spcAft>
-              <a:buClr>
-                <a:schemeClr val="dk1"/>
-              </a:buClr>
-              <a:buSzPts val="1100"/>
-              <a:buFont typeface="Arial"/>
-              <a:buNone/>
-            </a:pPr>
-            <a:r>
-              <a:rPr lang="en" dirty="0"/>
-              <a:t>Contenido y fuente de los datos</a:t>
-            </a:r>
-            <a:endParaRPr dirty="0"/>
-          </a:p>
-        </p:txBody>
-      </p:sp>
-      <p:sp>
-        <p:nvSpPr>
-          <p:cNvPr id="580" name="Google Shape;580;p61"/>
-          <p:cNvSpPr txBox="1">
-            <a:spLocks noGrp="1"/>
-          </p:cNvSpPr>
-          <p:nvPr>
-            <p:ph type="subTitle" idx="5"/>
-          </p:nvPr>
-        </p:nvSpPr>
-        <p:spPr>
-          <a:xfrm>
-            <a:off x="5909000" y="3753161"/>
-            <a:ext cx="2448000" cy="359100"/>
-          </a:xfrm>
-          <a:prstGeom prst="rect">
-            <a:avLst/>
-          </a:prstGeom>
-        </p:spPr>
-        <p:txBody>
-          <a:bodyPr spcFirstLastPara="1" wrap="square" lIns="91425" tIns="91425" rIns="91425" bIns="91425" anchor="t" anchorCtr="0">
-            <a:noAutofit/>
-          </a:bodyPr>
-          <a:lstStyle/>
-          <a:p>
-            <a:pPr marL="0" lvl="0" indent="0" algn="l" rtl="0">
-              <a:spcBef>
-                <a:spcPts val="0"/>
-              </a:spcBef>
-              <a:spcAft>
-                <a:spcPts val="0"/>
-              </a:spcAft>
-              <a:buClr>
-                <a:schemeClr val="dk1"/>
-              </a:buClr>
-              <a:buSzPts val="1100"/>
-              <a:buFont typeface="Arial"/>
-              <a:buNone/>
-            </a:pPr>
-            <a:r>
-              <a:rPr lang="en" dirty="0"/>
-              <a:t>Conclusiones</a:t>
-            </a:r>
-            <a:endParaRPr dirty="0"/>
-          </a:p>
-        </p:txBody>
-      </p:sp>
-      <p:sp>
-        <p:nvSpPr>
-          <p:cNvPr id="581" name="Google Shape;581;p61"/>
-          <p:cNvSpPr txBox="1">
-            <a:spLocks noGrp="1"/>
-          </p:cNvSpPr>
-          <p:nvPr>
-            <p:ph type="subTitle" idx="6"/>
-          </p:nvPr>
-        </p:nvSpPr>
-        <p:spPr>
-          <a:xfrm>
-            <a:off x="5909000" y="4112261"/>
-            <a:ext cx="2448000" cy="821100"/>
-          </a:xfrm>
-          <a:prstGeom prst="rect">
-            <a:avLst/>
-          </a:prstGeom>
-        </p:spPr>
-        <p:txBody>
-          <a:bodyPr spcFirstLastPara="1" wrap="square" lIns="91425" tIns="91425" rIns="91425" bIns="91425" anchor="t" anchorCtr="0">
-            <a:noAutofit/>
-          </a:bodyPr>
-          <a:lstStyle/>
-          <a:p>
-            <a:pPr marL="0" lvl="0" indent="0" algn="l" rtl="0">
-              <a:spcBef>
-                <a:spcPts val="0"/>
-              </a:spcBef>
-              <a:spcAft>
-                <a:spcPts val="0"/>
-              </a:spcAft>
-              <a:buClr>
-                <a:schemeClr val="dk1"/>
-              </a:buClr>
-              <a:buSzPts val="1100"/>
-              <a:buFont typeface="Arial"/>
-              <a:buNone/>
-            </a:pPr>
-            <a:r>
-              <a:rPr lang="en" dirty="0"/>
-              <a:t>Resultados obtenidos y futuras oportunidades</a:t>
-            </a:r>
-            <a:endParaRPr dirty="0"/>
-          </a:p>
-        </p:txBody>
-      </p:sp>
-      <p:sp>
-        <p:nvSpPr>
-          <p:cNvPr id="582" name="Google Shape;582;p61"/>
-          <p:cNvSpPr txBox="1">
-            <a:spLocks noGrp="1"/>
-          </p:cNvSpPr>
-          <p:nvPr>
-            <p:ph type="title"/>
-          </p:nvPr>
-        </p:nvSpPr>
-        <p:spPr>
-          <a:xfrm>
-            <a:off x="831900" y="717175"/>
-            <a:ext cx="3144900" cy="3945900"/>
-          </a:xfrm>
-          <a:prstGeom prst="rect">
-            <a:avLst/>
-          </a:prstGeom>
-        </p:spPr>
-        <p:txBody>
-          <a:bodyPr spcFirstLastPara="1" wrap="square" lIns="91425" tIns="91425" rIns="91425" bIns="91425" anchor="ctr" anchorCtr="0">
-            <a:noAutofit/>
-          </a:bodyPr>
-          <a:lstStyle/>
-          <a:p>
-            <a:pPr marL="0" lvl="0" indent="0" algn="ctr" rtl="0">
-              <a:spcBef>
-                <a:spcPts val="0"/>
-              </a:spcBef>
-              <a:spcAft>
-                <a:spcPts val="0"/>
-              </a:spcAft>
-              <a:buNone/>
-            </a:pPr>
-            <a:r>
-              <a:rPr lang="en" dirty="0"/>
-              <a:t>ÍNDICE</a:t>
-            </a:r>
-            <a:endParaRPr dirty="0"/>
-          </a:p>
-        </p:txBody>
-      </p:sp>
-      <p:sp>
-        <p:nvSpPr>
-          <p:cNvPr id="583" name="Google Shape;583;p61"/>
-          <p:cNvSpPr txBox="1">
-            <a:spLocks noGrp="1"/>
-          </p:cNvSpPr>
-          <p:nvPr>
-            <p:ph type="title" idx="4294967295"/>
-          </p:nvPr>
-        </p:nvSpPr>
-        <p:spPr>
-          <a:xfrm>
-            <a:off x="4887550" y="312270"/>
-            <a:ext cx="821100" cy="821100"/>
-          </a:xfrm>
-          <a:prstGeom prst="rect">
-            <a:avLst/>
-          </a:prstGeom>
-        </p:spPr>
-        <p:txBody>
-          <a:bodyPr spcFirstLastPara="1" wrap="square" lIns="91425" tIns="91425" rIns="91425" bIns="91425" anchor="t" anchorCtr="0">
-            <a:noAutofit/>
-          </a:bodyPr>
-          <a:lstStyle/>
-          <a:p>
-            <a:pPr marL="0" lvl="0" indent="0" algn="l" rtl="0">
-              <a:spcBef>
-                <a:spcPts val="0"/>
-              </a:spcBef>
-              <a:spcAft>
-                <a:spcPts val="0"/>
-              </a:spcAft>
-              <a:buNone/>
-            </a:pPr>
-            <a:r>
-              <a:rPr lang="en"/>
-              <a:t>1.</a:t>
-            </a:r>
-            <a:endParaRPr dirty="0"/>
-          </a:p>
-        </p:txBody>
-      </p:sp>
-      <p:sp>
-        <p:nvSpPr>
-          <p:cNvPr id="584" name="Google Shape;584;p61"/>
-          <p:cNvSpPr txBox="1">
-            <a:spLocks noGrp="1"/>
-          </p:cNvSpPr>
-          <p:nvPr>
-            <p:ph type="title" idx="4294967295"/>
-          </p:nvPr>
-        </p:nvSpPr>
-        <p:spPr>
-          <a:xfrm>
-            <a:off x="4887550" y="1434772"/>
-            <a:ext cx="821100" cy="821100"/>
-          </a:xfrm>
-          <a:prstGeom prst="rect">
-            <a:avLst/>
-          </a:prstGeom>
-        </p:spPr>
-        <p:txBody>
-          <a:bodyPr spcFirstLastPara="1" wrap="square" lIns="91425" tIns="91425" rIns="91425" bIns="91425" anchor="t" anchorCtr="0">
-            <a:noAutofit/>
-          </a:bodyPr>
-          <a:lstStyle/>
-          <a:p>
-            <a:pPr marL="0" lvl="0" indent="0" algn="l" rtl="0">
-              <a:spcBef>
-                <a:spcPts val="0"/>
-              </a:spcBef>
-              <a:spcAft>
-                <a:spcPts val="0"/>
-              </a:spcAft>
-              <a:buNone/>
-            </a:pPr>
-            <a:r>
-              <a:rPr lang="en"/>
-              <a:t>2.</a:t>
-            </a:r>
-            <a:endParaRPr dirty="0"/>
-          </a:p>
-        </p:txBody>
-      </p:sp>
-      <p:sp>
-        <p:nvSpPr>
-          <p:cNvPr id="585" name="Google Shape;585;p61"/>
-          <p:cNvSpPr txBox="1">
-            <a:spLocks noGrp="1"/>
-          </p:cNvSpPr>
-          <p:nvPr>
-            <p:ph type="title" idx="4294967295"/>
-          </p:nvPr>
-        </p:nvSpPr>
-        <p:spPr>
-          <a:xfrm>
-            <a:off x="4887550" y="3791733"/>
-            <a:ext cx="821100" cy="821100"/>
-          </a:xfrm>
-          <a:prstGeom prst="rect">
-            <a:avLst/>
-          </a:prstGeom>
-        </p:spPr>
-        <p:txBody>
-          <a:bodyPr spcFirstLastPara="1" wrap="square" lIns="91425" tIns="91425" rIns="91425" bIns="91425" anchor="t" anchorCtr="0">
-            <a:noAutofit/>
-          </a:bodyPr>
-          <a:lstStyle/>
-          <a:p>
-            <a:pPr marL="0" lvl="0" indent="0" algn="l" rtl="0">
-              <a:spcBef>
-                <a:spcPts val="0"/>
-              </a:spcBef>
-              <a:spcAft>
-                <a:spcPts val="0"/>
-              </a:spcAft>
-              <a:buNone/>
-            </a:pPr>
-            <a:r>
-              <a:rPr lang="en"/>
-              <a:t>3.</a:t>
-            </a:r>
-            <a:endParaRPr dirty="0"/>
-          </a:p>
-        </p:txBody>
-      </p:sp>
-      <p:sp>
-        <p:nvSpPr>
-          <p:cNvPr id="586" name="Google Shape;586;p61"/>
-          <p:cNvSpPr/>
-          <p:nvPr/>
-        </p:nvSpPr>
-        <p:spPr>
-          <a:xfrm>
-            <a:off x="4887550" y="1434761"/>
-            <a:ext cx="821100" cy="821100"/>
-          </a:xfrm>
-          <a:prstGeom prst="round1Rect">
-            <a:avLst>
-              <a:gd name="adj" fmla="val 16667"/>
-            </a:avLst>
-          </a:prstGeom>
-          <a:solidFill>
-            <a:schemeClr val="accent2"/>
-          </a:solidFill>
-          <a:ln>
-            <a:noFill/>
-          </a:ln>
-        </p:spPr>
-        <p:txBody>
-          <a:bodyPr spcFirstLastPara="1" wrap="square" lIns="91425" tIns="91425" rIns="91425" bIns="91425" anchor="ctr" anchorCtr="0">
-            <a:noAutofit/>
-          </a:bodyPr>
-          <a:lstStyle/>
-          <a:p>
-            <a:pPr marL="0" lvl="0" indent="0" algn="l" rtl="0">
-              <a:lnSpc>
-                <a:spcPct val="100000"/>
-              </a:lnSpc>
-              <a:spcBef>
-                <a:spcPts val="0"/>
-              </a:spcBef>
-              <a:spcAft>
-                <a:spcPts val="0"/>
-              </a:spcAft>
-              <a:buNone/>
-            </a:pPr>
-            <a:endParaRPr dirty="0"/>
-          </a:p>
-        </p:txBody>
-      </p:sp>
-      <p:sp>
-        <p:nvSpPr>
-          <p:cNvPr id="587" name="Google Shape;587;p61"/>
-          <p:cNvSpPr/>
-          <p:nvPr/>
-        </p:nvSpPr>
-        <p:spPr>
-          <a:xfrm>
-            <a:off x="4887550" y="305343"/>
-            <a:ext cx="821100" cy="821100"/>
-          </a:xfrm>
-          <a:prstGeom prst="round1Rect">
-            <a:avLst>
-              <a:gd name="adj" fmla="val 16667"/>
-            </a:avLst>
-          </a:prstGeom>
-          <a:solidFill>
-            <a:schemeClr val="accent3"/>
-          </a:solidFill>
-          <a:ln>
-            <a:noFill/>
-          </a:ln>
-        </p:spPr>
-        <p:txBody>
-          <a:bodyPr spcFirstLastPara="1" wrap="square" lIns="91425" tIns="91425" rIns="91425" bIns="91425" anchor="ctr" anchorCtr="0">
-            <a:noAutofit/>
-          </a:bodyPr>
-          <a:lstStyle/>
-          <a:p>
-            <a:pPr marL="0" lvl="0" indent="0" algn="l" rtl="0">
-              <a:lnSpc>
-                <a:spcPct val="100000"/>
-              </a:lnSpc>
-              <a:spcBef>
-                <a:spcPts val="0"/>
-              </a:spcBef>
-              <a:spcAft>
-                <a:spcPts val="0"/>
-              </a:spcAft>
-              <a:buNone/>
-            </a:pPr>
-            <a:endParaRPr dirty="0"/>
-          </a:p>
-        </p:txBody>
-      </p:sp>
-      <p:sp>
-        <p:nvSpPr>
-          <p:cNvPr id="588" name="Google Shape;588;p61"/>
-          <p:cNvSpPr/>
-          <p:nvPr/>
-        </p:nvSpPr>
-        <p:spPr>
-          <a:xfrm>
-            <a:off x="4887550" y="3791721"/>
-            <a:ext cx="821100" cy="821100"/>
-          </a:xfrm>
-          <a:prstGeom prst="round1Rect">
-            <a:avLst>
-              <a:gd name="adj" fmla="val 16667"/>
-            </a:avLst>
-          </a:prstGeom>
-          <a:solidFill>
-            <a:schemeClr val="accent1"/>
-          </a:solidFill>
-          <a:ln>
-            <a:noFill/>
-          </a:ln>
-        </p:spPr>
-        <p:txBody>
-          <a:bodyPr spcFirstLastPara="1" wrap="square" lIns="91425" tIns="91425" rIns="91425" bIns="91425" anchor="ctr" anchorCtr="0">
-            <a:noAutofit/>
-          </a:bodyPr>
-          <a:lstStyle/>
-          <a:p>
-            <a:pPr marL="0" lvl="0" indent="0" algn="l" rtl="0">
-              <a:lnSpc>
-                <a:spcPct val="100000"/>
-              </a:lnSpc>
-              <a:spcBef>
-                <a:spcPts val="0"/>
-              </a:spcBef>
-              <a:spcAft>
-                <a:spcPts val="0"/>
-              </a:spcAft>
-              <a:buNone/>
-            </a:pPr>
-            <a:endParaRPr dirty="0"/>
-          </a:p>
-        </p:txBody>
-      </p:sp>
-      <p:sp>
-        <p:nvSpPr>
-          <p:cNvPr id="589" name="Google Shape;589;p61"/>
-          <p:cNvSpPr txBox="1">
-            <a:spLocks noGrp="1"/>
-          </p:cNvSpPr>
-          <p:nvPr>
-            <p:ph type="title" idx="4294967295"/>
-          </p:nvPr>
-        </p:nvSpPr>
-        <p:spPr>
-          <a:xfrm>
-            <a:off x="4887550" y="422620"/>
-            <a:ext cx="821100" cy="600300"/>
-          </a:xfrm>
-          <a:prstGeom prst="rect">
-            <a:avLst/>
-          </a:prstGeom>
-        </p:spPr>
-        <p:txBody>
-          <a:bodyPr spcFirstLastPara="1" wrap="square" lIns="91425" tIns="91425" rIns="91425" bIns="91425" anchor="ctr" anchorCtr="0">
-            <a:noAutofit/>
-          </a:bodyPr>
-          <a:lstStyle/>
-          <a:p>
-            <a:pPr marL="0" lvl="0" indent="0" algn="ctr" rtl="0">
-              <a:spcBef>
-                <a:spcPts val="0"/>
-              </a:spcBef>
-              <a:spcAft>
-                <a:spcPts val="0"/>
-              </a:spcAft>
-              <a:buNone/>
-            </a:pPr>
-            <a:r>
-              <a:rPr lang="en"/>
-              <a:t>1.</a:t>
-            </a:r>
-            <a:endParaRPr dirty="0"/>
-          </a:p>
-        </p:txBody>
-      </p:sp>
-      <p:sp>
-        <p:nvSpPr>
-          <p:cNvPr id="590" name="Google Shape;590;p61"/>
-          <p:cNvSpPr txBox="1">
-            <a:spLocks noGrp="1"/>
-          </p:cNvSpPr>
-          <p:nvPr>
-            <p:ph type="title" idx="4294967295"/>
-          </p:nvPr>
-        </p:nvSpPr>
-        <p:spPr>
-          <a:xfrm>
-            <a:off x="4887550" y="1545172"/>
-            <a:ext cx="821100" cy="600300"/>
-          </a:xfrm>
-          <a:prstGeom prst="rect">
-            <a:avLst/>
-          </a:prstGeom>
-        </p:spPr>
-        <p:txBody>
-          <a:bodyPr spcFirstLastPara="1" wrap="square" lIns="91425" tIns="91425" rIns="91425" bIns="91425" anchor="ctr" anchorCtr="0">
-            <a:noAutofit/>
-          </a:bodyPr>
-          <a:lstStyle/>
-          <a:p>
-            <a:pPr marL="0" lvl="0" indent="0" algn="ctr" rtl="0">
-              <a:spcBef>
-                <a:spcPts val="0"/>
-              </a:spcBef>
-              <a:spcAft>
-                <a:spcPts val="0"/>
-              </a:spcAft>
-              <a:buNone/>
-            </a:pPr>
-            <a:r>
-              <a:rPr lang="en" dirty="0"/>
-              <a:t>2</a:t>
-            </a:r>
-            <a:endParaRPr dirty="0"/>
-          </a:p>
-        </p:txBody>
-      </p:sp>
-      <p:sp>
-        <p:nvSpPr>
-          <p:cNvPr id="591" name="Google Shape;591;p61"/>
-          <p:cNvSpPr txBox="1">
-            <a:spLocks noGrp="1"/>
-          </p:cNvSpPr>
-          <p:nvPr>
-            <p:ph type="title" idx="4294967295"/>
-          </p:nvPr>
-        </p:nvSpPr>
-        <p:spPr>
-          <a:xfrm>
-            <a:off x="4887550" y="3902191"/>
-            <a:ext cx="821100" cy="600300"/>
-          </a:xfrm>
-          <a:prstGeom prst="rect">
-            <a:avLst/>
-          </a:prstGeom>
-        </p:spPr>
-        <p:txBody>
-          <a:bodyPr spcFirstLastPara="1" wrap="square" lIns="91425" tIns="91425" rIns="91425" bIns="91425" anchor="ctr" anchorCtr="0">
-            <a:noAutofit/>
-          </a:bodyPr>
-          <a:lstStyle/>
-          <a:p>
-            <a:pPr marL="0" lvl="0" indent="0" algn="ctr" rtl="0">
-              <a:spcBef>
-                <a:spcPts val="0"/>
-              </a:spcBef>
-              <a:spcAft>
-                <a:spcPts val="0"/>
-              </a:spcAft>
-              <a:buNone/>
-            </a:pPr>
-            <a:r>
-              <a:rPr lang="en" dirty="0"/>
-              <a:t>4</a:t>
-            </a:r>
-            <a:endParaRPr dirty="0"/>
-          </a:p>
-        </p:txBody>
-      </p:sp>
-      <p:sp>
-        <p:nvSpPr>
-          <p:cNvPr id="2" name="Google Shape;578;p61">
-            <a:extLst>
-              <a:ext uri="{FF2B5EF4-FFF2-40B4-BE49-F238E27FC236}">
-                <a16:creationId xmlns:a16="http://schemas.microsoft.com/office/drawing/2014/main" id="{167ACCE0-9D7D-612A-92FB-4273806C6BE1}"/>
-              </a:ext>
-            </a:extLst>
-          </p:cNvPr>
-          <p:cNvSpPr txBox="1">
-            <a:spLocks/>
-          </p:cNvSpPr>
-          <p:nvPr/>
-        </p:nvSpPr>
-        <p:spPr>
-          <a:xfrm>
-            <a:off x="5909000" y="2554129"/>
-            <a:ext cx="2448000" cy="359100"/>
-          </a:xfrm>
-          <a:prstGeom prst="rect">
-            <a:avLst/>
-          </a:prstGeom>
-          <a:noFill/>
-          <a:ln>
-            <a:noFill/>
-          </a:ln>
-        </p:spPr>
-        <p:txBody>
-          <a:bodyPr spcFirstLastPara="1" wrap="square" lIns="91425" tIns="91425" rIns="91425" bIns="91425" anchor="t" anchorCtr="0">
-            <a:noAutofit/>
-          </a:bodyPr>
-          <a:lstStyle>
-            <a:defPPr marR="0" lvl="0" algn="l" rtl="0">
-              <a:lnSpc>
-                <a:spcPct val="100000"/>
-              </a:lnSpc>
-              <a:spcBef>
-                <a:spcPts val="0"/>
-              </a:spcBef>
-              <a:spcAft>
-                <a:spcPts val="0"/>
-              </a:spcAft>
-            </a:defPPr>
-            <a:lvl1pPr marL="457200" marR="0" lvl="0" indent="-317500" algn="l" rtl="0">
-              <a:lnSpc>
-                <a:spcPct val="100000"/>
-              </a:lnSpc>
-              <a:spcBef>
-                <a:spcPts val="0"/>
-              </a:spcBef>
-              <a:spcAft>
-                <a:spcPts val="0"/>
-              </a:spcAft>
-              <a:buClr>
-                <a:schemeClr val="accent1"/>
-              </a:buClr>
-              <a:buSzPts val="1400"/>
-              <a:buFont typeface="Montserrat"/>
-              <a:buNone/>
-              <a:defRPr sz="1600" b="1" i="0" u="none" strike="noStrike" cap="none">
-                <a:solidFill>
-                  <a:schemeClr val="accent3"/>
-                </a:solidFill>
-                <a:latin typeface="Montserrat"/>
-                <a:ea typeface="Montserrat"/>
-                <a:cs typeface="Montserrat"/>
-                <a:sym typeface="Montserrat"/>
-              </a:defRPr>
-            </a:lvl1pPr>
-            <a:lvl2pPr marL="914400" marR="0" lvl="1" indent="-317500" algn="l" rtl="0">
-              <a:lnSpc>
-                <a:spcPct val="100000"/>
-              </a:lnSpc>
-              <a:spcBef>
-                <a:spcPts val="0"/>
-              </a:spcBef>
-              <a:spcAft>
-                <a:spcPts val="0"/>
-              </a:spcAft>
-              <a:buClr>
-                <a:schemeClr val="accent1"/>
-              </a:buClr>
-              <a:buSzPts val="1400"/>
-              <a:buFont typeface="Montserrat"/>
-              <a:buNone/>
-              <a:defRPr sz="1400" b="0" i="0" u="none" strike="noStrike" cap="none">
-                <a:solidFill>
-                  <a:schemeClr val="accent1"/>
-                </a:solidFill>
-                <a:latin typeface="Montserrat"/>
-                <a:ea typeface="Montserrat"/>
-                <a:cs typeface="Montserrat"/>
-                <a:sym typeface="Montserrat"/>
-              </a:defRPr>
-            </a:lvl2pPr>
-            <a:lvl3pPr marL="1371600" marR="0" lvl="2" indent="-317500" algn="l" rtl="0">
-              <a:lnSpc>
-                <a:spcPct val="100000"/>
-              </a:lnSpc>
-              <a:spcBef>
-                <a:spcPts val="0"/>
-              </a:spcBef>
-              <a:spcAft>
-                <a:spcPts val="0"/>
-              </a:spcAft>
-              <a:buClr>
-                <a:schemeClr val="accent1"/>
-              </a:buClr>
-              <a:buSzPts val="1400"/>
-              <a:buFont typeface="Montserrat"/>
-              <a:buNone/>
-              <a:defRPr sz="1400" b="0" i="0" u="none" strike="noStrike" cap="none">
-                <a:solidFill>
-                  <a:schemeClr val="accent1"/>
-                </a:solidFill>
-                <a:latin typeface="Montserrat"/>
-                <a:ea typeface="Montserrat"/>
-                <a:cs typeface="Montserrat"/>
-                <a:sym typeface="Montserrat"/>
-              </a:defRPr>
-            </a:lvl3pPr>
-            <a:lvl4pPr marL="1828800" marR="0" lvl="3" indent="-317500" algn="l" rtl="0">
-              <a:lnSpc>
-                <a:spcPct val="100000"/>
-              </a:lnSpc>
-              <a:spcBef>
-                <a:spcPts val="0"/>
-              </a:spcBef>
-              <a:spcAft>
-                <a:spcPts val="0"/>
-              </a:spcAft>
-              <a:buClr>
-                <a:schemeClr val="accent1"/>
-              </a:buClr>
-              <a:buSzPts val="1400"/>
-              <a:buFont typeface="Montserrat"/>
-              <a:buNone/>
-              <a:defRPr sz="1400" b="0" i="0" u="none" strike="noStrike" cap="none">
-                <a:solidFill>
-                  <a:schemeClr val="accent1"/>
-                </a:solidFill>
-                <a:latin typeface="Montserrat"/>
-                <a:ea typeface="Montserrat"/>
-                <a:cs typeface="Montserrat"/>
-                <a:sym typeface="Montserrat"/>
-              </a:defRPr>
-            </a:lvl4pPr>
-            <a:lvl5pPr marL="2286000" marR="0" lvl="4" indent="-317500" algn="l" rtl="0">
-              <a:lnSpc>
-                <a:spcPct val="100000"/>
-              </a:lnSpc>
-              <a:spcBef>
-                <a:spcPts val="0"/>
-              </a:spcBef>
-              <a:spcAft>
-                <a:spcPts val="0"/>
-              </a:spcAft>
-              <a:buClr>
-                <a:schemeClr val="accent1"/>
-              </a:buClr>
-              <a:buSzPts val="1400"/>
-              <a:buFont typeface="Montserrat"/>
-              <a:buNone/>
-              <a:defRPr sz="1400" b="0" i="0" u="none" strike="noStrike" cap="none">
-                <a:solidFill>
-                  <a:schemeClr val="accent1"/>
-                </a:solidFill>
-                <a:latin typeface="Montserrat"/>
-                <a:ea typeface="Montserrat"/>
-                <a:cs typeface="Montserrat"/>
-                <a:sym typeface="Montserrat"/>
-              </a:defRPr>
-            </a:lvl5pPr>
-            <a:lvl6pPr marL="2743200" marR="0" lvl="5" indent="-317500" algn="l" rtl="0">
-              <a:lnSpc>
-                <a:spcPct val="100000"/>
-              </a:lnSpc>
-              <a:spcBef>
-                <a:spcPts val="0"/>
-              </a:spcBef>
-              <a:spcAft>
-                <a:spcPts val="0"/>
-              </a:spcAft>
-              <a:buClr>
-                <a:schemeClr val="accent1"/>
-              </a:buClr>
-              <a:buSzPts val="1400"/>
-              <a:buFont typeface="Montserrat"/>
-              <a:buNone/>
-              <a:defRPr sz="1400" b="0" i="0" u="none" strike="noStrike" cap="none">
-                <a:solidFill>
-                  <a:schemeClr val="accent1"/>
-                </a:solidFill>
-                <a:latin typeface="Montserrat"/>
-                <a:ea typeface="Montserrat"/>
-                <a:cs typeface="Montserrat"/>
-                <a:sym typeface="Montserrat"/>
-              </a:defRPr>
-            </a:lvl6pPr>
-            <a:lvl7pPr marL="3200400" marR="0" lvl="6" indent="-317500" algn="l" rtl="0">
-              <a:lnSpc>
-                <a:spcPct val="100000"/>
-              </a:lnSpc>
-              <a:spcBef>
-                <a:spcPts val="0"/>
-              </a:spcBef>
-              <a:spcAft>
-                <a:spcPts val="0"/>
-              </a:spcAft>
-              <a:buClr>
-                <a:schemeClr val="accent1"/>
-              </a:buClr>
-              <a:buSzPts val="1400"/>
-              <a:buFont typeface="Montserrat"/>
-              <a:buNone/>
-              <a:defRPr sz="1400" b="0" i="0" u="none" strike="noStrike" cap="none">
-                <a:solidFill>
-                  <a:schemeClr val="accent1"/>
-                </a:solidFill>
-                <a:latin typeface="Montserrat"/>
-                <a:ea typeface="Montserrat"/>
-                <a:cs typeface="Montserrat"/>
-                <a:sym typeface="Montserrat"/>
-              </a:defRPr>
-            </a:lvl7pPr>
-            <a:lvl8pPr marL="3657600" marR="0" lvl="7" indent="-317500" algn="l" rtl="0">
-              <a:lnSpc>
-                <a:spcPct val="100000"/>
-              </a:lnSpc>
-              <a:spcBef>
-                <a:spcPts val="0"/>
-              </a:spcBef>
-              <a:spcAft>
-                <a:spcPts val="0"/>
-              </a:spcAft>
-              <a:buClr>
-                <a:schemeClr val="accent1"/>
-              </a:buClr>
-              <a:buSzPts val="1400"/>
-              <a:buFont typeface="Montserrat"/>
-              <a:buNone/>
-              <a:defRPr sz="1400" b="0" i="0" u="none" strike="noStrike" cap="none">
-                <a:solidFill>
-                  <a:schemeClr val="accent1"/>
-                </a:solidFill>
-                <a:latin typeface="Montserrat"/>
-                <a:ea typeface="Montserrat"/>
-                <a:cs typeface="Montserrat"/>
-                <a:sym typeface="Montserrat"/>
-              </a:defRPr>
-            </a:lvl8pPr>
-            <a:lvl9pPr marL="4114800" marR="0" lvl="8" indent="-317500" algn="l" rtl="0">
-              <a:lnSpc>
-                <a:spcPct val="100000"/>
-              </a:lnSpc>
-              <a:spcBef>
-                <a:spcPts val="0"/>
-              </a:spcBef>
-              <a:spcAft>
-                <a:spcPts val="0"/>
-              </a:spcAft>
-              <a:buClr>
-                <a:schemeClr val="accent1"/>
-              </a:buClr>
-              <a:buSzPts val="1400"/>
-              <a:buFont typeface="Montserrat"/>
-              <a:buNone/>
-              <a:defRPr sz="1400" b="0" i="0" u="none" strike="noStrike" cap="none">
-                <a:solidFill>
-                  <a:schemeClr val="accent1"/>
-                </a:solidFill>
-                <a:latin typeface="Montserrat"/>
-                <a:ea typeface="Montserrat"/>
-                <a:cs typeface="Montserrat"/>
-                <a:sym typeface="Montserrat"/>
-              </a:defRPr>
-            </a:lvl9pPr>
-          </a:lstStyle>
-          <a:p>
-            <a:pPr marL="0" indent="0">
-              <a:buClr>
-                <a:schemeClr val="dk1"/>
-              </a:buClr>
-              <a:buSzPts val="1100"/>
-              <a:buFont typeface="Arial"/>
-              <a:buNone/>
-            </a:pPr>
-            <a:r>
-              <a:rPr lang="es-ES" dirty="0"/>
-              <a:t>Hipótesis</a:t>
-            </a:r>
-          </a:p>
-        </p:txBody>
-      </p:sp>
-      <p:sp>
-        <p:nvSpPr>
-          <p:cNvPr id="3" name="Google Shape;579;p61">
-            <a:extLst>
-              <a:ext uri="{FF2B5EF4-FFF2-40B4-BE49-F238E27FC236}">
-                <a16:creationId xmlns:a16="http://schemas.microsoft.com/office/drawing/2014/main" id="{52B42B7A-0D40-BD52-53EE-D7AED0648423}"/>
-              </a:ext>
-            </a:extLst>
-          </p:cNvPr>
-          <p:cNvSpPr txBox="1">
-            <a:spLocks/>
-          </p:cNvSpPr>
-          <p:nvPr/>
-        </p:nvSpPr>
-        <p:spPr>
-          <a:xfrm>
-            <a:off x="5909000" y="2970621"/>
-            <a:ext cx="2448000" cy="505211"/>
-          </a:xfrm>
-          <a:prstGeom prst="rect">
-            <a:avLst/>
-          </a:prstGeom>
-          <a:noFill/>
-          <a:ln>
-            <a:noFill/>
-          </a:ln>
-        </p:spPr>
-        <p:txBody>
-          <a:bodyPr spcFirstLastPara="1" wrap="square" lIns="91425" tIns="91425" rIns="91425" bIns="91425" anchor="t" anchorCtr="0">
-            <a:noAutofit/>
-          </a:bodyPr>
-          <a:lstStyle>
-            <a:defPPr marR="0" lvl="0" algn="l" rtl="0">
-              <a:lnSpc>
-                <a:spcPct val="100000"/>
-              </a:lnSpc>
-              <a:spcBef>
-                <a:spcPts val="0"/>
-              </a:spcBef>
-              <a:spcAft>
-                <a:spcPts val="0"/>
-              </a:spcAft>
-            </a:defPPr>
-            <a:lvl1pPr marL="457200" marR="0" lvl="0" indent="-317500" algn="l" rtl="0">
-              <a:lnSpc>
-                <a:spcPct val="100000"/>
-              </a:lnSpc>
-              <a:spcBef>
-                <a:spcPts val="0"/>
-              </a:spcBef>
-              <a:spcAft>
-                <a:spcPts val="0"/>
-              </a:spcAft>
-              <a:buClr>
-                <a:schemeClr val="accent1"/>
-              </a:buClr>
-              <a:buSzPts val="1400"/>
-              <a:buFont typeface="Montserrat"/>
-              <a:buNone/>
-              <a:defRPr sz="1400" b="0" i="0" u="none" strike="noStrike" cap="none">
-                <a:solidFill>
-                  <a:schemeClr val="accent1"/>
-                </a:solidFill>
-                <a:latin typeface="Montserrat"/>
-                <a:ea typeface="Montserrat"/>
-                <a:cs typeface="Montserrat"/>
-                <a:sym typeface="Montserrat"/>
-              </a:defRPr>
-            </a:lvl1pPr>
-            <a:lvl2pPr marL="914400" marR="0" lvl="1" indent="-317500" algn="l" rtl="0">
-              <a:lnSpc>
-                <a:spcPct val="100000"/>
-              </a:lnSpc>
-              <a:spcBef>
-                <a:spcPts val="0"/>
-              </a:spcBef>
-              <a:spcAft>
-                <a:spcPts val="0"/>
-              </a:spcAft>
-              <a:buClr>
-                <a:schemeClr val="accent1"/>
-              </a:buClr>
-              <a:buSzPts val="1400"/>
-              <a:buFont typeface="Montserrat"/>
-              <a:buNone/>
-              <a:defRPr sz="1400" b="0" i="0" u="none" strike="noStrike" cap="none">
-                <a:solidFill>
-                  <a:schemeClr val="accent1"/>
-                </a:solidFill>
-                <a:latin typeface="Montserrat"/>
-                <a:ea typeface="Montserrat"/>
-                <a:cs typeface="Montserrat"/>
-                <a:sym typeface="Montserrat"/>
-              </a:defRPr>
-            </a:lvl2pPr>
-            <a:lvl3pPr marL="1371600" marR="0" lvl="2" indent="-317500" algn="l" rtl="0">
-              <a:lnSpc>
-                <a:spcPct val="100000"/>
-              </a:lnSpc>
-              <a:spcBef>
-                <a:spcPts val="0"/>
-              </a:spcBef>
-              <a:spcAft>
-                <a:spcPts val="0"/>
-              </a:spcAft>
-              <a:buClr>
-                <a:schemeClr val="accent1"/>
-              </a:buClr>
-              <a:buSzPts val="1400"/>
-              <a:buFont typeface="Montserrat"/>
-              <a:buNone/>
-              <a:defRPr sz="1400" b="0" i="0" u="none" strike="noStrike" cap="none">
-                <a:solidFill>
-                  <a:schemeClr val="accent1"/>
-                </a:solidFill>
-                <a:latin typeface="Montserrat"/>
-                <a:ea typeface="Montserrat"/>
-                <a:cs typeface="Montserrat"/>
-                <a:sym typeface="Montserrat"/>
-              </a:defRPr>
-            </a:lvl3pPr>
-            <a:lvl4pPr marL="1828800" marR="0" lvl="3" indent="-317500" algn="l" rtl="0">
-              <a:lnSpc>
-                <a:spcPct val="100000"/>
-              </a:lnSpc>
-              <a:spcBef>
-                <a:spcPts val="0"/>
-              </a:spcBef>
-              <a:spcAft>
-                <a:spcPts val="0"/>
-              </a:spcAft>
-              <a:buClr>
-                <a:schemeClr val="accent1"/>
-              </a:buClr>
-              <a:buSzPts val="1400"/>
-              <a:buFont typeface="Montserrat"/>
-              <a:buNone/>
-              <a:defRPr sz="1400" b="0" i="0" u="none" strike="noStrike" cap="none">
-                <a:solidFill>
-                  <a:schemeClr val="accent1"/>
-                </a:solidFill>
-                <a:latin typeface="Montserrat"/>
-                <a:ea typeface="Montserrat"/>
-                <a:cs typeface="Montserrat"/>
-                <a:sym typeface="Montserrat"/>
-              </a:defRPr>
-            </a:lvl4pPr>
-            <a:lvl5pPr marL="2286000" marR="0" lvl="4" indent="-317500" algn="l" rtl="0">
-              <a:lnSpc>
-                <a:spcPct val="100000"/>
-              </a:lnSpc>
-              <a:spcBef>
-                <a:spcPts val="0"/>
-              </a:spcBef>
-              <a:spcAft>
-                <a:spcPts val="0"/>
-              </a:spcAft>
-              <a:buClr>
-                <a:schemeClr val="accent1"/>
-              </a:buClr>
-              <a:buSzPts val="1400"/>
-              <a:buFont typeface="Montserrat"/>
-              <a:buNone/>
-              <a:defRPr sz="1400" b="0" i="0" u="none" strike="noStrike" cap="none">
-                <a:solidFill>
-                  <a:schemeClr val="accent1"/>
-                </a:solidFill>
-                <a:latin typeface="Montserrat"/>
-                <a:ea typeface="Montserrat"/>
-                <a:cs typeface="Montserrat"/>
-                <a:sym typeface="Montserrat"/>
-              </a:defRPr>
-            </a:lvl5pPr>
-            <a:lvl6pPr marL="2743200" marR="0" lvl="5" indent="-317500" algn="l" rtl="0">
-              <a:lnSpc>
-                <a:spcPct val="100000"/>
-              </a:lnSpc>
-              <a:spcBef>
-                <a:spcPts val="0"/>
-              </a:spcBef>
-              <a:spcAft>
-                <a:spcPts val="0"/>
-              </a:spcAft>
-              <a:buClr>
-                <a:schemeClr val="accent1"/>
-              </a:buClr>
-              <a:buSzPts val="1400"/>
-              <a:buFont typeface="Montserrat"/>
-              <a:buNone/>
-              <a:defRPr sz="1400" b="0" i="0" u="none" strike="noStrike" cap="none">
-                <a:solidFill>
-                  <a:schemeClr val="accent1"/>
-                </a:solidFill>
-                <a:latin typeface="Montserrat"/>
-                <a:ea typeface="Montserrat"/>
-                <a:cs typeface="Montserrat"/>
-                <a:sym typeface="Montserrat"/>
-              </a:defRPr>
-            </a:lvl6pPr>
-            <a:lvl7pPr marL="3200400" marR="0" lvl="6" indent="-317500" algn="l" rtl="0">
-              <a:lnSpc>
-                <a:spcPct val="100000"/>
-              </a:lnSpc>
-              <a:spcBef>
-                <a:spcPts val="0"/>
-              </a:spcBef>
-              <a:spcAft>
-                <a:spcPts val="0"/>
-              </a:spcAft>
-              <a:buClr>
-                <a:schemeClr val="accent1"/>
-              </a:buClr>
-              <a:buSzPts val="1400"/>
-              <a:buFont typeface="Montserrat"/>
-              <a:buNone/>
-              <a:defRPr sz="1400" b="0" i="0" u="none" strike="noStrike" cap="none">
-                <a:solidFill>
-                  <a:schemeClr val="accent1"/>
-                </a:solidFill>
-                <a:latin typeface="Montserrat"/>
-                <a:ea typeface="Montserrat"/>
-                <a:cs typeface="Montserrat"/>
-                <a:sym typeface="Montserrat"/>
-              </a:defRPr>
-            </a:lvl7pPr>
-            <a:lvl8pPr marL="3657600" marR="0" lvl="7" indent="-317500" algn="l" rtl="0">
-              <a:lnSpc>
-                <a:spcPct val="100000"/>
-              </a:lnSpc>
-              <a:spcBef>
-                <a:spcPts val="0"/>
-              </a:spcBef>
-              <a:spcAft>
-                <a:spcPts val="0"/>
-              </a:spcAft>
-              <a:buClr>
-                <a:schemeClr val="accent1"/>
-              </a:buClr>
-              <a:buSzPts val="1400"/>
-              <a:buFont typeface="Montserrat"/>
-              <a:buNone/>
-              <a:defRPr sz="1400" b="0" i="0" u="none" strike="noStrike" cap="none">
-                <a:solidFill>
-                  <a:schemeClr val="accent1"/>
-                </a:solidFill>
-                <a:latin typeface="Montserrat"/>
-                <a:ea typeface="Montserrat"/>
-                <a:cs typeface="Montserrat"/>
-                <a:sym typeface="Montserrat"/>
-              </a:defRPr>
-            </a:lvl8pPr>
-            <a:lvl9pPr marL="4114800" marR="0" lvl="8" indent="-317500" algn="l" rtl="0">
-              <a:lnSpc>
-                <a:spcPct val="100000"/>
-              </a:lnSpc>
-              <a:spcBef>
-                <a:spcPts val="0"/>
-              </a:spcBef>
-              <a:spcAft>
-                <a:spcPts val="0"/>
-              </a:spcAft>
-              <a:buClr>
-                <a:schemeClr val="accent1"/>
-              </a:buClr>
-              <a:buSzPts val="1400"/>
-              <a:buFont typeface="Montserrat"/>
-              <a:buNone/>
-              <a:defRPr sz="1400" b="0" i="0" u="none" strike="noStrike" cap="none">
-                <a:solidFill>
-                  <a:schemeClr val="accent1"/>
-                </a:solidFill>
-                <a:latin typeface="Montserrat"/>
-                <a:ea typeface="Montserrat"/>
-                <a:cs typeface="Montserrat"/>
-                <a:sym typeface="Montserrat"/>
-              </a:defRPr>
-            </a:lvl9pPr>
-          </a:lstStyle>
-          <a:p>
-            <a:pPr marL="0" indent="0">
-              <a:buClr>
-                <a:schemeClr val="dk1"/>
-              </a:buClr>
-              <a:buSzPts val="1100"/>
-              <a:buFont typeface="Arial"/>
-              <a:buNone/>
-            </a:pPr>
-            <a:r>
-              <a:rPr lang="es-ES" dirty="0"/>
-              <a:t>Respondiendo 4 preguntas principales</a:t>
-            </a:r>
-            <a:endParaRPr lang="en-US" dirty="0"/>
-          </a:p>
-        </p:txBody>
-      </p:sp>
-      <p:sp>
-        <p:nvSpPr>
-          <p:cNvPr id="4" name="Google Shape;584;p61">
-            <a:extLst>
-              <a:ext uri="{FF2B5EF4-FFF2-40B4-BE49-F238E27FC236}">
-                <a16:creationId xmlns:a16="http://schemas.microsoft.com/office/drawing/2014/main" id="{24A3B783-A41A-CB60-9995-46282DB3BB72}"/>
-              </a:ext>
-            </a:extLst>
-          </p:cNvPr>
-          <p:cNvSpPr txBox="1">
-            <a:spLocks/>
-          </p:cNvSpPr>
-          <p:nvPr/>
-        </p:nvSpPr>
-        <p:spPr>
-          <a:xfrm>
-            <a:off x="4887550" y="2654743"/>
-            <a:ext cx="821100" cy="821100"/>
-          </a:xfrm>
-          <a:prstGeom prst="rect">
-            <a:avLst/>
-          </a:prstGeom>
-          <a:noFill/>
-          <a:ln>
-            <a:noFill/>
-          </a:ln>
-        </p:spPr>
-        <p:txBody>
-          <a:bodyPr spcFirstLastPara="1" wrap="square" lIns="91425" tIns="91425" rIns="91425" bIns="91425" anchor="t" anchorCtr="0">
-            <a:noAutofit/>
-          </a:bodyPr>
-          <a:lstStyle>
-            <a:defPPr marR="0" lvl="0" algn="l" rtl="0">
-              <a:lnSpc>
-                <a:spcPct val="100000"/>
-              </a:lnSpc>
-              <a:spcBef>
-                <a:spcPts val="0"/>
-              </a:spcBef>
-              <a:spcAft>
-                <a:spcPts val="0"/>
-              </a:spcAft>
-            </a:defPPr>
-            <a:lvl1pPr marR="0" lvl="0" algn="l" rtl="0">
-              <a:lnSpc>
-                <a:spcPct val="100000"/>
-              </a:lnSpc>
-              <a:spcBef>
-                <a:spcPts val="0"/>
-              </a:spcBef>
-              <a:spcAft>
-                <a:spcPts val="0"/>
-              </a:spcAft>
-              <a:buClr>
-                <a:schemeClr val="lt1"/>
-              </a:buClr>
-              <a:buSzPts val="3000"/>
-              <a:buFont typeface="Montserrat"/>
-              <a:buNone/>
-              <a:defRPr sz="3000" b="1" i="0" u="none" strike="noStrike" cap="none">
-                <a:solidFill>
-                  <a:schemeClr val="lt1"/>
-                </a:solidFill>
-                <a:latin typeface="Montserrat"/>
-                <a:ea typeface="Montserrat"/>
-                <a:cs typeface="Montserrat"/>
-                <a:sym typeface="Montserrat"/>
-              </a:defRPr>
-            </a:lvl1pPr>
-            <a:lvl2pPr marR="0" lvl="1" algn="l" rtl="0">
-              <a:lnSpc>
-                <a:spcPct val="100000"/>
-              </a:lnSpc>
-              <a:spcBef>
-                <a:spcPts val="0"/>
-              </a:spcBef>
-              <a:spcAft>
-                <a:spcPts val="0"/>
-              </a:spcAft>
-              <a:buClr>
-                <a:schemeClr val="dk1"/>
-              </a:buClr>
-              <a:buSzPts val="2800"/>
-              <a:buFont typeface="Arial"/>
-              <a:buNone/>
-              <a:defRPr sz="2800" b="0" i="0" u="none" strike="noStrike" cap="none">
-                <a:solidFill>
-                  <a:schemeClr val="dk1"/>
-                </a:solidFill>
-                <a:latin typeface="Arial"/>
-                <a:ea typeface="Arial"/>
-                <a:cs typeface="Arial"/>
-                <a:sym typeface="Arial"/>
-              </a:defRPr>
-            </a:lvl2pPr>
-            <a:lvl3pPr marR="0" lvl="2" algn="l" rtl="0">
-              <a:lnSpc>
-                <a:spcPct val="100000"/>
-              </a:lnSpc>
-              <a:spcBef>
-                <a:spcPts val="0"/>
-              </a:spcBef>
-              <a:spcAft>
-                <a:spcPts val="0"/>
-              </a:spcAft>
-              <a:buClr>
-                <a:schemeClr val="dk1"/>
-              </a:buClr>
-              <a:buSzPts val="2800"/>
-              <a:buFont typeface="Arial"/>
-              <a:buNone/>
-              <a:defRPr sz="2800" b="0" i="0" u="none" strike="noStrike" cap="none">
-                <a:solidFill>
-                  <a:schemeClr val="dk1"/>
-                </a:solidFill>
-                <a:latin typeface="Arial"/>
-                <a:ea typeface="Arial"/>
-                <a:cs typeface="Arial"/>
-                <a:sym typeface="Arial"/>
-              </a:defRPr>
-            </a:lvl3pPr>
-            <a:lvl4pPr marR="0" lvl="3" algn="l" rtl="0">
-              <a:lnSpc>
-                <a:spcPct val="100000"/>
-              </a:lnSpc>
-              <a:spcBef>
-                <a:spcPts val="0"/>
-              </a:spcBef>
-              <a:spcAft>
-                <a:spcPts val="0"/>
-              </a:spcAft>
-              <a:buClr>
-                <a:schemeClr val="dk1"/>
-              </a:buClr>
-              <a:buSzPts val="2800"/>
-              <a:buFont typeface="Arial"/>
-              <a:buNone/>
-              <a:defRPr sz="2800" b="0" i="0" u="none" strike="noStrike" cap="none">
-                <a:solidFill>
-                  <a:schemeClr val="dk1"/>
-                </a:solidFill>
-                <a:latin typeface="Arial"/>
-                <a:ea typeface="Arial"/>
-                <a:cs typeface="Arial"/>
-                <a:sym typeface="Arial"/>
-              </a:defRPr>
-            </a:lvl4pPr>
-            <a:lvl5pPr marR="0" lvl="4" algn="l" rtl="0">
-              <a:lnSpc>
-                <a:spcPct val="100000"/>
-              </a:lnSpc>
-              <a:spcBef>
-                <a:spcPts val="0"/>
-              </a:spcBef>
-              <a:spcAft>
-                <a:spcPts val="0"/>
-              </a:spcAft>
-              <a:buClr>
-                <a:schemeClr val="dk1"/>
-              </a:buClr>
-              <a:buSzPts val="2800"/>
-              <a:buFont typeface="Arial"/>
-              <a:buNone/>
-              <a:defRPr sz="2800" b="0" i="0" u="none" strike="noStrike" cap="none">
-                <a:solidFill>
-                  <a:schemeClr val="dk1"/>
-                </a:solidFill>
-                <a:latin typeface="Arial"/>
-                <a:ea typeface="Arial"/>
-                <a:cs typeface="Arial"/>
-                <a:sym typeface="Arial"/>
-              </a:defRPr>
-            </a:lvl5pPr>
-            <a:lvl6pPr marR="0" lvl="5" algn="l" rtl="0">
-              <a:lnSpc>
-                <a:spcPct val="100000"/>
-              </a:lnSpc>
-              <a:spcBef>
-                <a:spcPts val="0"/>
-              </a:spcBef>
-              <a:spcAft>
-                <a:spcPts val="0"/>
-              </a:spcAft>
-              <a:buClr>
-                <a:schemeClr val="dk1"/>
-              </a:buClr>
-              <a:buSzPts val="2800"/>
-              <a:buFont typeface="Arial"/>
-              <a:buNone/>
-              <a:defRPr sz="2800" b="0" i="0" u="none" strike="noStrike" cap="none">
-                <a:solidFill>
-                  <a:schemeClr val="dk1"/>
-                </a:solidFill>
-                <a:latin typeface="Arial"/>
-                <a:ea typeface="Arial"/>
-                <a:cs typeface="Arial"/>
-                <a:sym typeface="Arial"/>
-              </a:defRPr>
-            </a:lvl6pPr>
-            <a:lvl7pPr marR="0" lvl="6" algn="l" rtl="0">
-              <a:lnSpc>
-                <a:spcPct val="100000"/>
-              </a:lnSpc>
-              <a:spcBef>
-                <a:spcPts val="0"/>
-              </a:spcBef>
-              <a:spcAft>
-                <a:spcPts val="0"/>
-              </a:spcAft>
-              <a:buClr>
-                <a:schemeClr val="dk1"/>
-              </a:buClr>
-              <a:buSzPts val="2800"/>
-              <a:buFont typeface="Arial"/>
-              <a:buNone/>
-              <a:defRPr sz="2800" b="0" i="0" u="none" strike="noStrike" cap="none">
-                <a:solidFill>
-                  <a:schemeClr val="dk1"/>
-                </a:solidFill>
-                <a:latin typeface="Arial"/>
-                <a:ea typeface="Arial"/>
-                <a:cs typeface="Arial"/>
-                <a:sym typeface="Arial"/>
-              </a:defRPr>
-            </a:lvl7pPr>
-            <a:lvl8pPr marR="0" lvl="7" algn="l" rtl="0">
-              <a:lnSpc>
-                <a:spcPct val="100000"/>
-              </a:lnSpc>
-              <a:spcBef>
-                <a:spcPts val="0"/>
-              </a:spcBef>
-              <a:spcAft>
-                <a:spcPts val="0"/>
-              </a:spcAft>
-              <a:buClr>
-                <a:schemeClr val="dk1"/>
-              </a:buClr>
-              <a:buSzPts val="2800"/>
-              <a:buFont typeface="Arial"/>
-              <a:buNone/>
-              <a:defRPr sz="2800" b="0" i="0" u="none" strike="noStrike" cap="none">
-                <a:solidFill>
-                  <a:schemeClr val="dk1"/>
-                </a:solidFill>
-                <a:latin typeface="Arial"/>
-                <a:ea typeface="Arial"/>
-                <a:cs typeface="Arial"/>
-                <a:sym typeface="Arial"/>
-              </a:defRPr>
-            </a:lvl8pPr>
-            <a:lvl9pPr marR="0" lvl="8" algn="l" rtl="0">
-              <a:lnSpc>
-                <a:spcPct val="100000"/>
-              </a:lnSpc>
-              <a:spcBef>
-                <a:spcPts val="0"/>
-              </a:spcBef>
-              <a:spcAft>
-                <a:spcPts val="0"/>
-              </a:spcAft>
-              <a:buClr>
-                <a:schemeClr val="dk1"/>
-              </a:buClr>
-              <a:buSzPts val="2800"/>
-              <a:buFont typeface="Arial"/>
-              <a:buNone/>
-              <a:defRPr sz="2800" b="0" i="0" u="none" strike="noStrike" cap="none">
-                <a:solidFill>
-                  <a:schemeClr val="dk1"/>
-                </a:solidFill>
-                <a:latin typeface="Arial"/>
-                <a:ea typeface="Arial"/>
-                <a:cs typeface="Arial"/>
-                <a:sym typeface="Arial"/>
-              </a:defRPr>
-            </a:lvl9pPr>
-          </a:lstStyle>
-          <a:p>
-            <a:r>
-              <a:rPr lang="en"/>
-              <a:t>2.</a:t>
-            </a:r>
-          </a:p>
-        </p:txBody>
-      </p:sp>
-      <p:sp>
-        <p:nvSpPr>
-          <p:cNvPr id="5" name="Google Shape;586;p61">
-            <a:extLst>
-              <a:ext uri="{FF2B5EF4-FFF2-40B4-BE49-F238E27FC236}">
-                <a16:creationId xmlns:a16="http://schemas.microsoft.com/office/drawing/2014/main" id="{E0428A5D-903A-AA34-4BEA-0200AD9A6509}"/>
-              </a:ext>
-            </a:extLst>
-          </p:cNvPr>
-          <p:cNvSpPr/>
-          <p:nvPr/>
-        </p:nvSpPr>
-        <p:spPr>
-          <a:xfrm>
-            <a:off x="4887550" y="2612732"/>
-            <a:ext cx="821100" cy="821100"/>
-          </a:xfrm>
-          <a:prstGeom prst="round1Rect">
-            <a:avLst>
-              <a:gd name="adj" fmla="val 16667"/>
-            </a:avLst>
-          </a:prstGeom>
-          <a:solidFill>
-            <a:schemeClr val="accent5"/>
-          </a:solidFill>
-          <a:ln>
-            <a:noFill/>
-          </a:ln>
-        </p:spPr>
-        <p:txBody>
-          <a:bodyPr spcFirstLastPara="1" wrap="square" lIns="91425" tIns="91425" rIns="91425" bIns="91425" anchor="ctr" anchorCtr="0">
-            <a:noAutofit/>
-          </a:bodyPr>
-          <a:lstStyle/>
-          <a:p>
-            <a:pPr marL="0" lvl="0" indent="0" algn="l" rtl="0">
-              <a:lnSpc>
-                <a:spcPct val="100000"/>
-              </a:lnSpc>
-              <a:spcBef>
-                <a:spcPts val="0"/>
-              </a:spcBef>
-              <a:spcAft>
-                <a:spcPts val="0"/>
-              </a:spcAft>
-              <a:buNone/>
-            </a:pPr>
-            <a:endParaRPr/>
-          </a:p>
-        </p:txBody>
-      </p:sp>
-      <p:sp>
-        <p:nvSpPr>
-          <p:cNvPr id="6" name="Google Shape;590;p61">
-            <a:extLst>
-              <a:ext uri="{FF2B5EF4-FFF2-40B4-BE49-F238E27FC236}">
-                <a16:creationId xmlns:a16="http://schemas.microsoft.com/office/drawing/2014/main" id="{77F84C63-7D7C-FE04-F550-A5E5161C3E6B}"/>
-              </a:ext>
-            </a:extLst>
-          </p:cNvPr>
-          <p:cNvSpPr txBox="1">
-            <a:spLocks/>
-          </p:cNvSpPr>
-          <p:nvPr/>
-        </p:nvSpPr>
-        <p:spPr>
-          <a:xfrm>
-            <a:off x="4887550" y="2723132"/>
-            <a:ext cx="821100" cy="600300"/>
-          </a:xfrm>
-          <a:prstGeom prst="rect">
-            <a:avLst/>
-          </a:prstGeom>
-          <a:noFill/>
-          <a:ln>
-            <a:noFill/>
-          </a:ln>
-        </p:spPr>
-        <p:txBody>
-          <a:bodyPr spcFirstLastPara="1" wrap="square" lIns="91425" tIns="91425" rIns="91425" bIns="91425" anchor="ctr" anchorCtr="0">
-            <a:noAutofit/>
-          </a:bodyPr>
-          <a:lstStyle>
-            <a:defPPr marR="0" lvl="0" algn="l" rtl="0">
-              <a:lnSpc>
-                <a:spcPct val="100000"/>
-              </a:lnSpc>
-              <a:spcBef>
-                <a:spcPts val="0"/>
-              </a:spcBef>
-              <a:spcAft>
-                <a:spcPts val="0"/>
-              </a:spcAft>
-            </a:defPPr>
-            <a:lvl1pPr marR="0" lvl="0" algn="l" rtl="0">
-              <a:lnSpc>
-                <a:spcPct val="100000"/>
-              </a:lnSpc>
-              <a:spcBef>
-                <a:spcPts val="0"/>
-              </a:spcBef>
-              <a:spcAft>
-                <a:spcPts val="0"/>
-              </a:spcAft>
-              <a:buClr>
-                <a:schemeClr val="lt1"/>
-              </a:buClr>
-              <a:buSzPts val="3000"/>
-              <a:buFont typeface="Montserrat"/>
-              <a:buNone/>
-              <a:defRPr sz="3000" b="1" i="0" u="none" strike="noStrike" cap="none">
-                <a:solidFill>
-                  <a:schemeClr val="lt1"/>
-                </a:solidFill>
-                <a:latin typeface="Montserrat"/>
-                <a:ea typeface="Montserrat"/>
-                <a:cs typeface="Montserrat"/>
-                <a:sym typeface="Montserrat"/>
-              </a:defRPr>
-            </a:lvl1pPr>
-            <a:lvl2pPr marR="0" lvl="1" algn="l" rtl="0">
-              <a:lnSpc>
-                <a:spcPct val="100000"/>
-              </a:lnSpc>
-              <a:spcBef>
-                <a:spcPts val="0"/>
-              </a:spcBef>
-              <a:spcAft>
-                <a:spcPts val="0"/>
-              </a:spcAft>
-              <a:buClr>
-                <a:schemeClr val="dk1"/>
-              </a:buClr>
-              <a:buSzPts val="2800"/>
-              <a:buFont typeface="Arial"/>
-              <a:buNone/>
-              <a:defRPr sz="2800" b="0" i="0" u="none" strike="noStrike" cap="none">
-                <a:solidFill>
-                  <a:schemeClr val="dk1"/>
-                </a:solidFill>
-                <a:latin typeface="Arial"/>
-                <a:ea typeface="Arial"/>
-                <a:cs typeface="Arial"/>
-                <a:sym typeface="Arial"/>
-              </a:defRPr>
-            </a:lvl2pPr>
-            <a:lvl3pPr marR="0" lvl="2" algn="l" rtl="0">
-              <a:lnSpc>
-                <a:spcPct val="100000"/>
-              </a:lnSpc>
-              <a:spcBef>
-                <a:spcPts val="0"/>
-              </a:spcBef>
-              <a:spcAft>
-                <a:spcPts val="0"/>
-              </a:spcAft>
-              <a:buClr>
-                <a:schemeClr val="dk1"/>
-              </a:buClr>
-              <a:buSzPts val="2800"/>
-              <a:buFont typeface="Arial"/>
-              <a:buNone/>
-              <a:defRPr sz="2800" b="0" i="0" u="none" strike="noStrike" cap="none">
-                <a:solidFill>
-                  <a:schemeClr val="dk1"/>
-                </a:solidFill>
-                <a:latin typeface="Arial"/>
-                <a:ea typeface="Arial"/>
-                <a:cs typeface="Arial"/>
-                <a:sym typeface="Arial"/>
-              </a:defRPr>
-            </a:lvl3pPr>
-            <a:lvl4pPr marR="0" lvl="3" algn="l" rtl="0">
-              <a:lnSpc>
-                <a:spcPct val="100000"/>
-              </a:lnSpc>
-              <a:spcBef>
-                <a:spcPts val="0"/>
-              </a:spcBef>
-              <a:spcAft>
-                <a:spcPts val="0"/>
-              </a:spcAft>
-              <a:buClr>
-                <a:schemeClr val="dk1"/>
-              </a:buClr>
-              <a:buSzPts val="2800"/>
-              <a:buFont typeface="Arial"/>
-              <a:buNone/>
-              <a:defRPr sz="2800" b="0" i="0" u="none" strike="noStrike" cap="none">
-                <a:solidFill>
-                  <a:schemeClr val="dk1"/>
-                </a:solidFill>
-                <a:latin typeface="Arial"/>
-                <a:ea typeface="Arial"/>
-                <a:cs typeface="Arial"/>
-                <a:sym typeface="Arial"/>
-              </a:defRPr>
-            </a:lvl4pPr>
-            <a:lvl5pPr marR="0" lvl="4" algn="l" rtl="0">
-              <a:lnSpc>
-                <a:spcPct val="100000"/>
-              </a:lnSpc>
-              <a:spcBef>
-                <a:spcPts val="0"/>
-              </a:spcBef>
-              <a:spcAft>
-                <a:spcPts val="0"/>
-              </a:spcAft>
-              <a:buClr>
-                <a:schemeClr val="dk1"/>
-              </a:buClr>
-              <a:buSzPts val="2800"/>
-              <a:buFont typeface="Arial"/>
-              <a:buNone/>
-              <a:defRPr sz="2800" b="0" i="0" u="none" strike="noStrike" cap="none">
-                <a:solidFill>
-                  <a:schemeClr val="dk1"/>
-                </a:solidFill>
-                <a:latin typeface="Arial"/>
-                <a:ea typeface="Arial"/>
-                <a:cs typeface="Arial"/>
-                <a:sym typeface="Arial"/>
-              </a:defRPr>
-            </a:lvl5pPr>
-            <a:lvl6pPr marR="0" lvl="5" algn="l" rtl="0">
-              <a:lnSpc>
-                <a:spcPct val="100000"/>
-              </a:lnSpc>
-              <a:spcBef>
-                <a:spcPts val="0"/>
-              </a:spcBef>
-              <a:spcAft>
-                <a:spcPts val="0"/>
-              </a:spcAft>
-              <a:buClr>
-                <a:schemeClr val="dk1"/>
-              </a:buClr>
-              <a:buSzPts val="2800"/>
-              <a:buFont typeface="Arial"/>
-              <a:buNone/>
-              <a:defRPr sz="2800" b="0" i="0" u="none" strike="noStrike" cap="none">
-                <a:solidFill>
-                  <a:schemeClr val="dk1"/>
-                </a:solidFill>
-                <a:latin typeface="Arial"/>
-                <a:ea typeface="Arial"/>
-                <a:cs typeface="Arial"/>
-                <a:sym typeface="Arial"/>
-              </a:defRPr>
-            </a:lvl6pPr>
-            <a:lvl7pPr marR="0" lvl="6" algn="l" rtl="0">
-              <a:lnSpc>
-                <a:spcPct val="100000"/>
-              </a:lnSpc>
-              <a:spcBef>
-                <a:spcPts val="0"/>
-              </a:spcBef>
-              <a:spcAft>
-                <a:spcPts val="0"/>
-              </a:spcAft>
-              <a:buClr>
-                <a:schemeClr val="dk1"/>
-              </a:buClr>
-              <a:buSzPts val="2800"/>
-              <a:buFont typeface="Arial"/>
-              <a:buNone/>
-              <a:defRPr sz="2800" b="0" i="0" u="none" strike="noStrike" cap="none">
-                <a:solidFill>
-                  <a:schemeClr val="dk1"/>
-                </a:solidFill>
-                <a:latin typeface="Arial"/>
-                <a:ea typeface="Arial"/>
-                <a:cs typeface="Arial"/>
-                <a:sym typeface="Arial"/>
-              </a:defRPr>
-            </a:lvl7pPr>
-            <a:lvl8pPr marR="0" lvl="7" algn="l" rtl="0">
-              <a:lnSpc>
-                <a:spcPct val="100000"/>
-              </a:lnSpc>
-              <a:spcBef>
-                <a:spcPts val="0"/>
-              </a:spcBef>
-              <a:spcAft>
-                <a:spcPts val="0"/>
-              </a:spcAft>
-              <a:buClr>
-                <a:schemeClr val="dk1"/>
-              </a:buClr>
-              <a:buSzPts val="2800"/>
-              <a:buFont typeface="Arial"/>
-              <a:buNone/>
-              <a:defRPr sz="2800" b="0" i="0" u="none" strike="noStrike" cap="none">
-                <a:solidFill>
-                  <a:schemeClr val="dk1"/>
-                </a:solidFill>
-                <a:latin typeface="Arial"/>
-                <a:ea typeface="Arial"/>
-                <a:cs typeface="Arial"/>
-                <a:sym typeface="Arial"/>
-              </a:defRPr>
-            </a:lvl8pPr>
-            <a:lvl9pPr marR="0" lvl="8" algn="l" rtl="0">
-              <a:lnSpc>
-                <a:spcPct val="100000"/>
-              </a:lnSpc>
-              <a:spcBef>
-                <a:spcPts val="0"/>
-              </a:spcBef>
-              <a:spcAft>
-                <a:spcPts val="0"/>
-              </a:spcAft>
-              <a:buClr>
-                <a:schemeClr val="dk1"/>
-              </a:buClr>
-              <a:buSzPts val="2800"/>
-              <a:buFont typeface="Arial"/>
-              <a:buNone/>
-              <a:defRPr sz="2800" b="0" i="0" u="none" strike="noStrike" cap="none">
-                <a:solidFill>
-                  <a:schemeClr val="dk1"/>
-                </a:solidFill>
-                <a:latin typeface="Arial"/>
-                <a:ea typeface="Arial"/>
-                <a:cs typeface="Arial"/>
-                <a:sym typeface="Arial"/>
-              </a:defRPr>
-            </a:lvl9pPr>
-          </a:lstStyle>
-          <a:p>
-            <a:pPr algn="ctr"/>
-            <a:r>
-              <a:rPr lang="en" dirty="0"/>
-              <a:t>3</a:t>
-            </a:r>
-          </a:p>
-        </p:txBody>
-      </p:sp>
-    </p:spTree>
-  </p:cSld>
-  <p:clrMapOvr>
-    <a:masterClrMapping/>
-  </p:clrMapOvr>
-</p:sld>
-</file>
-
 <file path=ppt/slides/slide3.xml><?xml version="1.0" encoding="utf-8"?>
 <p:sld xmlns:a="http://schemas.openxmlformats.org/drawingml/2006/main" xmlns:r="http://schemas.openxmlformats.org/officeDocument/2006/relationships" xmlns:p="http://schemas.openxmlformats.org/presentationml/2006/main">
   <p:cSld>

</xml_diff>